<commit_message>
Changed Dart.pptx, slide 25 from 'inklusive' to 'exclusive'
</commit_message>
<xml_diff>
--- a/Dart.pptx
+++ b/Dart.pptx
@@ -530,7 +530,7 @@
                   <a:schemeClr val="tx2"/>
                 </a:solidFill>
               </a:rPr>
-              <a:t>30.03.2022</a:t>
+              <a:t>05.10.2022</a:t>
             </a:fld>
             <a:endParaRPr lang="de-DE">
               <a:solidFill>
@@ -880,7 +880,7 @@
             <a:fld id="{B4113CCE-1A1A-46DB-884A-AE560F65C3AF}" type="datetimeFigureOut">
               <a:rPr lang="de-DE" smtClean="0"/>
               <a:pPr/>
-              <a:t>30.03.2022</a:t>
+              <a:t>05.10.2022</a:t>
             </a:fld>
             <a:endParaRPr lang="de-DE"/>
           </a:p>
@@ -2427,7 +2427,19 @@
           <a:p>
             <a:r>
               <a:rPr lang="de-DE" dirty="0"/>
-              <a:t>Ende: das letzte Zeichen ist inklusive.</a:t>
+              <a:t>Ende: das letzte Zeichen </a:t>
+            </a:r>
+            <a:r>
+              <a:rPr lang="de-DE"/>
+              <a:t>ist </a:t>
+            </a:r>
+            <a:r>
+              <a:rPr lang="de-DE" smtClean="0"/>
+              <a:t>exklusive</a:t>
+            </a:r>
+            <a:r>
+              <a:rPr lang="de-DE" dirty="0"/>
+              <a:t>.</a:t>
             </a:r>
           </a:p>
           <a:p>
@@ -9307,7 +9319,7 @@
           <a:p>
             <a:fld id="{4E6DF7AA-8899-480A-AE8B-97B651237939}" type="datetime1">
               <a:rPr lang="de-DE" smtClean="0"/>
-              <a:t>30.03.2022</a:t>
+              <a:t>05.10.2022</a:t>
             </a:fld>
             <a:endParaRPr lang="de-DE"/>
           </a:p>
@@ -9512,7 +9524,7 @@
           <a:p>
             <a:fld id="{A1082C62-1968-4D03-BE49-CB116A4D6814}" type="datetime1">
               <a:rPr lang="de-DE" smtClean="0"/>
-              <a:t>30.03.2022</a:t>
+              <a:t>05.10.2022</a:t>
             </a:fld>
             <a:endParaRPr lang="de-DE"/>
           </a:p>
@@ -9666,7 +9678,7 @@
           <a:p>
             <a:fld id="{C0E04462-FF80-4281-98D0-2AB88E65DA84}" type="datetime1">
               <a:rPr lang="de-DE" smtClean="0"/>
-              <a:t>30.03.2022</a:t>
+              <a:t>05.10.2022</a:t>
             </a:fld>
             <a:endParaRPr lang="de-DE"/>
           </a:p>
@@ -9903,7 +9915,7 @@
           <a:p>
             <a:fld id="{1FAA5A7F-2A4E-40D6-9FFE-960B13817A2C}" type="datetime1">
               <a:rPr lang="de-DE" smtClean="0"/>
-              <a:t>30.03.2022</a:t>
+              <a:t>05.10.2022</a:t>
             </a:fld>
             <a:endParaRPr lang="de-DE"/>
           </a:p>
@@ -10079,7 +10091,7 @@
           <a:p>
             <a:fld id="{382DDC3E-10C9-4B92-B2FB-A8167FB6AB1D}" type="datetime1">
               <a:rPr lang="de-DE" smtClean="0"/>
-              <a:t>30.03.2022</a:t>
+              <a:t>05.10.2022</a:t>
             </a:fld>
             <a:endParaRPr lang="de-DE"/>
           </a:p>
@@ -10255,7 +10267,7 @@
           <a:p>
             <a:fld id="{8159FE7A-07D2-4D3F-9855-29B7F3DF1D43}" type="datetime1">
               <a:rPr lang="de-DE" smtClean="0"/>
-              <a:t>30.03.2022</a:t>
+              <a:t>05.10.2022</a:t>
             </a:fld>
             <a:endParaRPr lang="de-DE"/>
           </a:p>
@@ -10405,7 +10417,7 @@
           <a:p>
             <a:fld id="{7CF1A54B-9CB9-49D3-BA48-5A7ECDBA0943}" type="datetime1">
               <a:rPr lang="de-DE" smtClean="0"/>
-              <a:t>30.03.2022</a:t>
+              <a:t>05.10.2022</a:t>
             </a:fld>
             <a:endParaRPr lang="de-DE"/>
           </a:p>
@@ -10503,7 +10515,7 @@
           <a:p>
             <a:fld id="{5621DBFA-780B-465A-97B9-CC4792E01430}" type="datetime1">
               <a:rPr lang="de-DE" smtClean="0"/>
-              <a:t>30.03.2022</a:t>
+              <a:t>05.10.2022</a:t>
             </a:fld>
             <a:endParaRPr lang="de-DE"/>
           </a:p>
@@ -10627,7 +10639,7 @@
           <a:p>
             <a:fld id="{13ADA68E-BD65-4999-8C0B-CC0F110C2BD3}" type="datetime1">
               <a:rPr lang="de-DE" smtClean="0"/>
-              <a:t>30.03.2022</a:t>
+              <a:t>05.10.2022</a:t>
             </a:fld>
             <a:endParaRPr lang="de-DE"/>
           </a:p>
@@ -10811,7 +10823,7 @@
           <a:p>
             <a:fld id="{93B55C80-8AAA-4242-8442-4A53184707C3}" type="datetime1">
               <a:rPr lang="de-DE" smtClean="0"/>
-              <a:t>30.03.2022</a:t>
+              <a:t>05.10.2022</a:t>
             </a:fld>
             <a:endParaRPr lang="de-DE"/>
           </a:p>
@@ -11016,7 +11028,7 @@
           <a:p>
             <a:fld id="{4485BB24-7FA9-422A-BF70-F9FA49C1D9F8}" type="datetime1">
               <a:rPr lang="de-DE" smtClean="0"/>
-              <a:t>30.03.2022</a:t>
+              <a:t>05.10.2022</a:t>
             </a:fld>
             <a:endParaRPr lang="de-DE"/>
           </a:p>
@@ -11374,7 +11386,7 @@
           <a:p>
             <a:fld id="{3CD93E9C-CF59-4162-A977-F7642EDBB23A}" type="datetime1">
               <a:rPr lang="de-DE" smtClean="0"/>
-              <a:t>30.03.2022</a:t>
+              <a:t>05.10.2022</a:t>
             </a:fld>
             <a:endParaRPr lang="de-DE" dirty="0"/>
           </a:p>
@@ -12015,7 +12027,7 @@
           <a:p>
             <a:fld id="{6FE8A2CE-6D32-4716-A090-EDD7EE0B4140}" type="datetime1">
               <a:rPr lang="de-DE" smtClean="0"/>
-              <a:t>30.03.2022</a:t>
+              <a:t>05.10.2022</a:t>
             </a:fld>
             <a:endParaRPr lang="de-DE" dirty="0"/>
           </a:p>
@@ -12687,7 +12699,7 @@
           <a:p>
             <a:fld id="{603113A9-B1ED-4EC0-A094-9858FCF2D0C8}" type="datetime1">
               <a:rPr lang="de-DE" smtClean="0"/>
-              <a:t>30.03.2022</a:t>
+              <a:t>05.10.2022</a:t>
             </a:fld>
             <a:endParaRPr lang="de-DE"/>
           </a:p>
@@ -12748,6 +12760,13 @@
   <p:clrMapOvr>
     <a:masterClrMapping/>
   </p:clrMapOvr>
+  <p:timing>
+    <p:tnLst>
+      <p:par>
+        <p:cTn id="1" dur="indefinite" restart="never" nodeType="tmRoot"/>
+      </p:par>
+    </p:tnLst>
+  </p:timing>
 </p:sld>
 </file>
 
@@ -12849,7 +12868,7 @@
           <a:p>
             <a:fld id="{D4664C08-255D-43EF-A97B-FABF96999946}" type="datetime1">
               <a:rPr lang="de-DE" smtClean="0"/>
-              <a:t>30.03.2022</a:t>
+              <a:t>05.10.2022</a:t>
             </a:fld>
             <a:endParaRPr lang="de-DE"/>
           </a:p>
@@ -13156,7 +13175,7 @@
           <a:p>
             <a:fld id="{3F431DAA-9B38-40B6-A989-743F7941179E}" type="datetime1">
               <a:rPr lang="de-DE" smtClean="0"/>
-              <a:t>30.03.2022</a:t>
+              <a:t>05.10.2022</a:t>
             </a:fld>
             <a:endParaRPr lang="de-DE"/>
           </a:p>
@@ -13328,7 +13347,7 @@
           <a:p>
             <a:fld id="{90FC750D-92E1-43D8-A4A2-8761C4AC9C9C}" type="datetime1">
               <a:rPr lang="de-DE" smtClean="0"/>
-              <a:t>30.03.2022</a:t>
+              <a:t>05.10.2022</a:t>
             </a:fld>
             <a:endParaRPr lang="de-DE"/>
           </a:p>
@@ -13559,7 +13578,7 @@
           <a:p>
             <a:fld id="{67B86D56-690E-44D4-B025-B41069787D15}" type="datetime1">
               <a:rPr lang="de-DE" smtClean="0"/>
-              <a:t>30.03.2022</a:t>
+              <a:t>05.10.2022</a:t>
             </a:fld>
             <a:endParaRPr lang="de-DE"/>
           </a:p>
@@ -13813,7 +13832,7 @@
           <a:p>
             <a:fld id="{252C698B-F0B1-44D7-8F7D-9D6299D534F0}" type="datetime1">
               <a:rPr lang="de-DE" smtClean="0"/>
-              <a:t>30.03.2022</a:t>
+              <a:t>05.10.2022</a:t>
             </a:fld>
             <a:endParaRPr lang="de-DE"/>
           </a:p>
@@ -14316,7 +14335,7 @@
           <a:p>
             <a:fld id="{A952138C-0142-4C6B-A620-863AA96BBBE1}" type="datetime1">
               <a:rPr lang="de-DE" smtClean="0"/>
-              <a:t>30.03.2022</a:t>
+              <a:t>05.10.2022</a:t>
             </a:fld>
             <a:endParaRPr lang="de-DE"/>
           </a:p>
@@ -14552,7 +14571,7 @@
           <a:p>
             <a:fld id="{7127E464-1A99-4532-A297-E1D7378D9E61}" type="datetime1">
               <a:rPr lang="de-DE" smtClean="0"/>
-              <a:t>30.03.2022</a:t>
+              <a:t>05.10.2022</a:t>
             </a:fld>
             <a:endParaRPr lang="de-DE"/>
           </a:p>
@@ -14933,7 +14952,7 @@
           <a:p>
             <a:fld id="{77B5C711-A7A8-40A0-AEA6-3F77D4628817}" type="datetime1">
               <a:rPr lang="de-DE" smtClean="0"/>
-              <a:t>30.03.2022</a:t>
+              <a:t>05.10.2022</a:t>
             </a:fld>
             <a:endParaRPr lang="de-DE"/>
           </a:p>
@@ -15312,7 +15331,7 @@
           <a:p>
             <a:fld id="{27A2010A-1149-4F23-80A2-1B4570F18F3A}" type="datetime1">
               <a:rPr lang="de-DE" smtClean="0"/>
-              <a:t>30.03.2022</a:t>
+              <a:t>05.10.2022</a:t>
             </a:fld>
             <a:endParaRPr lang="de-DE"/>
           </a:p>
@@ -15569,7 +15588,7 @@
           <a:p>
             <a:fld id="{B70EBCA3-FB0B-48D9-A2E5-56DBD5624AFE}" type="datetime1">
               <a:rPr lang="de-DE" smtClean="0"/>
-              <a:t>30.03.2022</a:t>
+              <a:t>05.10.2022</a:t>
             </a:fld>
             <a:endParaRPr lang="de-DE"/>
           </a:p>
@@ -15883,7 +15902,7 @@
           <a:p>
             <a:fld id="{AAEBEB04-CBF0-4835-872C-2565D4E2EBF1}" type="datetime1">
               <a:rPr lang="de-DE" smtClean="0"/>
-              <a:t>30.03.2022</a:t>
+              <a:t>05.10.2022</a:t>
             </a:fld>
             <a:endParaRPr lang="de-DE"/>
           </a:p>
@@ -16186,7 +16205,7 @@
           <a:p>
             <a:fld id="{92A047F3-1820-4570-AC17-C8DA167C5F14}" type="datetime1">
               <a:rPr lang="de-DE" smtClean="0"/>
-              <a:t>30.03.2022</a:t>
+              <a:t>05.10.2022</a:t>
             </a:fld>
             <a:endParaRPr lang="de-DE"/>
           </a:p>
@@ -16655,7 +16674,7 @@
           <a:p>
             <a:fld id="{8F663D0B-A90A-4472-ADF1-2D4D5E0E002A}" type="datetime1">
               <a:rPr lang="de-DE" smtClean="0"/>
-              <a:t>30.03.2022</a:t>
+              <a:t>05.10.2022</a:t>
             </a:fld>
             <a:endParaRPr lang="de-DE"/>
           </a:p>
@@ -16845,7 +16864,7 @@
           <a:p>
             <a:fld id="{59577B53-2C7E-4EC5-B9C8-6C04D3456AA1}" type="datetime1">
               <a:rPr lang="de-DE" smtClean="0"/>
-              <a:t>30.03.2022</a:t>
+              <a:t>05.10.2022</a:t>
             </a:fld>
             <a:endParaRPr lang="de-DE"/>
           </a:p>
@@ -17407,7 +17426,7 @@
           <a:p>
             <a:fld id="{C3460205-A5AE-420E-9AB9-04AA7C4205FA}" type="datetime1">
               <a:rPr lang="de-DE" smtClean="0"/>
-              <a:t>30.03.2022</a:t>
+              <a:t>05.10.2022</a:t>
             </a:fld>
             <a:endParaRPr lang="de-DE"/>
           </a:p>
@@ -17904,7 +17923,7 @@
           <a:p>
             <a:fld id="{C81998FD-B568-4E47-AA9F-CE36B3FEB5BA}" type="datetime1">
               <a:rPr lang="de-DE" smtClean="0"/>
-              <a:t>30.03.2022</a:t>
+              <a:t>05.10.2022</a:t>
             </a:fld>
             <a:endParaRPr lang="de-DE"/>
           </a:p>
@@ -18260,7 +18279,7 @@
           <a:p>
             <a:fld id="{0A4F56F1-7827-4042-A276-DAF40AC0B000}" type="datetime1">
               <a:rPr lang="de-DE" smtClean="0"/>
-              <a:t>30.03.2022</a:t>
+              <a:t>05.10.2022</a:t>
             </a:fld>
             <a:endParaRPr lang="de-DE"/>
           </a:p>
@@ -18558,7 +18577,7 @@
           <a:p>
             <a:fld id="{DAB02174-66FA-41E9-A997-DF7D3619438B}" type="datetime1">
               <a:rPr lang="de-DE" smtClean="0"/>
-              <a:t>30.03.2022</a:t>
+              <a:t>05.10.2022</a:t>
             </a:fld>
             <a:endParaRPr lang="de-DE"/>
           </a:p>
@@ -18939,7 +18958,7 @@
           <a:p>
             <a:fld id="{BDFFDF87-2C7B-4FBB-B7F3-0EB8FC88FA6F}" type="datetime1">
               <a:rPr lang="de-DE" smtClean="0"/>
-              <a:t>30.03.2022</a:t>
+              <a:t>05.10.2022</a:t>
             </a:fld>
             <a:endParaRPr lang="de-DE"/>
           </a:p>
@@ -19272,7 +19291,7 @@
           <a:p>
             <a:fld id="{4AEAFF43-79D1-488F-88E5-AECF0C52E4F6}" type="datetime1">
               <a:rPr lang="de-DE" smtClean="0"/>
-              <a:t>30.03.2022</a:t>
+              <a:t>05.10.2022</a:t>
             </a:fld>
             <a:endParaRPr lang="de-DE"/>
           </a:p>
@@ -19550,7 +19569,7 @@
           <a:p>
             <a:fld id="{F3624D99-4580-4939-A184-6854C4D65CB3}" type="datetime1">
               <a:rPr lang="de-DE" smtClean="0"/>
-              <a:t>30.03.2022</a:t>
+              <a:t>05.10.2022</a:t>
             </a:fld>
             <a:endParaRPr lang="de-DE"/>
           </a:p>
@@ -19746,7 +19765,7 @@
           <a:p>
             <a:fld id="{642CBE49-AABD-4678-8D76-A8610D6E4D30}" type="datetime1">
               <a:rPr lang="de-DE" smtClean="0"/>
-              <a:t>30.03.2022</a:t>
+              <a:t>05.10.2022</a:t>
             </a:fld>
             <a:endParaRPr lang="de-DE"/>
           </a:p>
@@ -20013,7 +20032,7 @@
           <a:p>
             <a:fld id="{2E581C20-4FEA-4BDB-99ED-7F7C03D2ECE0}" type="datetime1">
               <a:rPr lang="de-DE" smtClean="0"/>
-              <a:t>30.03.2022</a:t>
+              <a:t>05.10.2022</a:t>
             </a:fld>
             <a:endParaRPr lang="de-DE"/>
           </a:p>
@@ -20447,7 +20466,7 @@
           <a:p>
             <a:fld id="{9C5032AF-412C-4954-8799-22E9C987B64F}" type="datetime1">
               <a:rPr lang="de-DE" smtClean="0"/>
-              <a:t>30.03.2022</a:t>
+              <a:t>05.10.2022</a:t>
             </a:fld>
             <a:endParaRPr lang="de-DE"/>
           </a:p>
@@ -21025,7 +21044,7 @@
           <a:p>
             <a:fld id="{F2FEDD9D-5594-473A-899D-C0AD9514F726}" type="datetime1">
               <a:rPr lang="de-DE" smtClean="0"/>
-              <a:t>30.03.2022</a:t>
+              <a:t>05.10.2022</a:t>
             </a:fld>
             <a:endParaRPr lang="de-DE"/>
           </a:p>
@@ -21287,7 +21306,7 @@
           <a:p>
             <a:fld id="{95C3B550-B314-4EBE-B643-25AC9427FA8B}" type="datetime1">
               <a:rPr lang="de-DE" smtClean="0"/>
-              <a:t>30.03.2022</a:t>
+              <a:t>05.10.2022</a:t>
             </a:fld>
             <a:endParaRPr lang="de-DE"/>
           </a:p>
@@ -21633,7 +21652,7 @@
           <a:p>
             <a:fld id="{767B626B-00B4-4CEC-8206-7F4851B03FEF}" type="datetime1">
               <a:rPr lang="de-DE" smtClean="0"/>
-              <a:t>30.03.2022</a:t>
+              <a:t>05.10.2022</a:t>
             </a:fld>
             <a:endParaRPr lang="de-DE"/>
           </a:p>
@@ -21945,7 +21964,7 @@
           <a:p>
             <a:fld id="{102EEC64-5E38-4CDE-986C-4F454B58738A}" type="datetime1">
               <a:rPr lang="de-DE" smtClean="0"/>
-              <a:t>30.03.2022</a:t>
+              <a:t>05.10.2022</a:t>
             </a:fld>
             <a:endParaRPr lang="de-DE"/>
           </a:p>
@@ -22178,7 +22197,7 @@
           <a:p>
             <a:fld id="{8B9E1184-3E8E-4927-B70E-FCD133F545CF}" type="datetime1">
               <a:rPr lang="de-DE" smtClean="0"/>
-              <a:t>30.03.2022</a:t>
+              <a:t>05.10.2022</a:t>
             </a:fld>
             <a:endParaRPr lang="de-DE"/>
           </a:p>
@@ -22375,6 +22394,10 @@
               </a:rPr>
               <a:t>) {</a:t>
             </a:r>
+            <a:r>
+              <a:rPr lang="de-DE" i="1" dirty="0"/>
+              <a:t/>
+            </a:r>
             <a:br>
               <a:rPr lang="de-DE" i="1" dirty="0"/>
             </a:br>
@@ -22473,6 +22496,10 @@
               </a:rPr>
               <a:t>) {</a:t>
             </a:r>
+            <a:r>
+              <a:rPr lang="de-DE" i="1" dirty="0"/>
+              <a:t/>
+            </a:r>
             <a:br>
               <a:rPr lang="de-DE" i="1" dirty="0"/>
             </a:br>
@@ -22531,6 +22558,10 @@
               </a:rPr>
               <a:t> {</a:t>
             </a:r>
+            <a:r>
+              <a:rPr lang="de-DE" dirty="0"/>
+              <a:t/>
+            </a:r>
             <a:br>
               <a:rPr lang="de-DE" dirty="0"/>
             </a:br>
@@ -22606,7 +22637,7 @@
           <a:p>
             <a:fld id="{372285A9-CAD1-4F8C-A320-59D4C92876C5}" type="datetime1">
               <a:rPr lang="de-DE" smtClean="0"/>
-              <a:t>30.03.2022</a:t>
+              <a:t>05.10.2022</a:t>
             </a:fld>
             <a:endParaRPr lang="de-DE"/>
           </a:p>
@@ -22819,7 +22850,7 @@
           <a:p>
             <a:fld id="{2F8DC1E6-2D30-4DE7-9C9D-5217FE18022E}" type="datetime1">
               <a:rPr lang="de-DE" smtClean="0"/>
-              <a:t>30.03.2022</a:t>
+              <a:t>05.10.2022</a:t>
             </a:fld>
             <a:endParaRPr lang="de-DE"/>
           </a:p>
@@ -22963,7 +22994,7 @@
           <a:p>
             <a:fld id="{893F816E-7DC2-4064-87AA-D097DF435DB9}" type="datetime1">
               <a:rPr lang="de-DE" smtClean="0"/>
-              <a:t>30.03.2022</a:t>
+              <a:t>05.10.2022</a:t>
             </a:fld>
             <a:endParaRPr lang="de-DE"/>
           </a:p>
@@ -23200,7 +23231,7 @@
           <a:p>
             <a:fld id="{637BE197-E414-48F3-B656-784E07538695}" type="datetime1">
               <a:rPr lang="de-DE" smtClean="0"/>
-              <a:t>30.03.2022</a:t>
+              <a:t>05.10.2022</a:t>
             </a:fld>
             <a:endParaRPr lang="de-DE"/>
           </a:p>
@@ -23496,7 +23527,7 @@
           <a:p>
             <a:fld id="{AC9925A1-4637-41D7-AEAC-8AA9FDFB7140}" type="datetime1">
               <a:rPr lang="de-DE" smtClean="0"/>
-              <a:t>30.03.2022</a:t>
+              <a:t>05.10.2022</a:t>
             </a:fld>
             <a:endParaRPr lang="de-DE"/>
           </a:p>
@@ -24079,7 +24110,7 @@
           <a:p>
             <a:fld id="{BC048919-3C08-48F6-A0CD-915EC777362A}" type="datetime1">
               <a:rPr lang="de-DE" smtClean="0"/>
-              <a:t>30.03.2022</a:t>
+              <a:t>05.10.2022</a:t>
             </a:fld>
             <a:endParaRPr lang="de-DE"/>
           </a:p>
@@ -24332,7 +24363,7 @@
           <a:p>
             <a:fld id="{94C91350-6869-4C72-8675-ECEAAAF05F8D}" type="datetime1">
               <a:rPr lang="de-DE" smtClean="0"/>
-              <a:t>30.03.2022</a:t>
+              <a:t>05.10.2022</a:t>
             </a:fld>
             <a:endParaRPr lang="de-DE"/>
           </a:p>
@@ -24674,7 +24705,7 @@
           <a:p>
             <a:fld id="{ACA1733B-6687-4EEA-9A6B-2EF228C82457}" type="datetime1">
               <a:rPr lang="de-DE" smtClean="0"/>
-              <a:t>30.03.2022</a:t>
+              <a:t>05.10.2022</a:t>
             </a:fld>
             <a:endParaRPr lang="de-DE"/>
           </a:p>
@@ -25007,7 +25038,7 @@
           <a:p>
             <a:fld id="{2BBD85E3-27A5-4125-9DB2-C537C85BBE8A}" type="datetime1">
               <a:rPr lang="de-DE" smtClean="0"/>
-              <a:t>30.03.2022</a:t>
+              <a:t>05.10.2022</a:t>
             </a:fld>
             <a:endParaRPr lang="de-DE"/>
           </a:p>
@@ -25182,7 +25213,7 @@
           <a:p>
             <a:fld id="{115AC75E-72B2-486D-BEF5-A13F9B218F2F}" type="datetime1">
               <a:rPr lang="de-DE" smtClean="0"/>
-              <a:t>30.03.2022</a:t>
+              <a:t>05.10.2022</a:t>
             </a:fld>
             <a:endParaRPr lang="de-DE"/>
           </a:p>
@@ -25460,7 +25491,7 @@
               <a:rPr lang="de-DE" dirty="0"/>
               <a:t>Zugriff über den Key in Klammern:</a:t>
             </a:r>
-            <a:br>
+            <a:r>
               <a:rPr lang="de-DE" b="1" dirty="0">
                 <a:solidFill>
                   <a:schemeClr val="accent1">
@@ -25468,34 +25499,26 @@
                   </a:schemeClr>
                 </a:solidFill>
               </a:rPr>
-            </a:br>
-            <a:r>
-              <a:rPr lang="de-DE" b="1" dirty="0" err="1">
+              <a:t/>
+            </a:r>
+            <a:br>
+              <a:rPr lang="de-DE" b="1" dirty="0">
                 <a:solidFill>
                   <a:schemeClr val="accent1">
                     <a:lumMod val="75000"/>
                   </a:schemeClr>
                 </a:solidFill>
               </a:rPr>
-              <a:t>var</a:t>
-            </a:r>
-            <a:r>
-              <a:rPr lang="de-DE" b="1" dirty="0">
+            </a:br>
+            <a:r>
+              <a:rPr lang="de-DE" b="1" dirty="0" err="1">
                 <a:solidFill>
                   <a:schemeClr val="accent1">
                     <a:lumMod val="75000"/>
                   </a:schemeClr>
                 </a:solidFill>
               </a:rPr>
-              <a:t> </a:t>
-            </a:r>
-            <a:r>
-              <a:rPr lang="de-DE" b="1" i="1" dirty="0" err="1">
-                <a:solidFill>
-                  <a:schemeClr val="tx2"/>
-                </a:solidFill>
-              </a:rPr>
-              <a:t>value</a:t>
+              <a:t>var</a:t>
             </a:r>
             <a:r>
               <a:rPr lang="de-DE" b="1" dirty="0">
@@ -25505,7 +25528,7 @@
                   </a:schemeClr>
                 </a:solidFill>
               </a:rPr>
-              <a:t> = </a:t>
+              <a:t> </a:t>
             </a:r>
             <a:r>
               <a:rPr lang="de-DE" b="1" i="1" dirty="0" err="1">
@@ -25513,7 +25536,7 @@
                   <a:schemeClr val="tx2"/>
                 </a:solidFill>
               </a:rPr>
-              <a:t>name</a:t>
+              <a:t>value</a:t>
             </a:r>
             <a:r>
               <a:rPr lang="de-DE" b="1" dirty="0">
@@ -25523,7 +25546,7 @@
                   </a:schemeClr>
                 </a:solidFill>
               </a:rPr>
-              <a:t>[</a:t>
+              <a:t> = </a:t>
             </a:r>
             <a:r>
               <a:rPr lang="de-DE" b="1" i="1" dirty="0" err="1">
@@ -25531,7 +25554,7 @@
                   <a:schemeClr val="tx2"/>
                 </a:solidFill>
               </a:rPr>
-              <a:t>key</a:t>
+              <a:t>name</a:t>
             </a:r>
             <a:r>
               <a:rPr lang="de-DE" b="1" dirty="0">
@@ -25541,6 +25564,24 @@
                   </a:schemeClr>
                 </a:solidFill>
               </a:rPr>
+              <a:t>[</a:t>
+            </a:r>
+            <a:r>
+              <a:rPr lang="de-DE" b="1" i="1" dirty="0" err="1">
+                <a:solidFill>
+                  <a:schemeClr val="tx2"/>
+                </a:solidFill>
+              </a:rPr>
+              <a:t>key</a:t>
+            </a:r>
+            <a:r>
+              <a:rPr lang="de-DE" b="1" dirty="0">
+                <a:solidFill>
+                  <a:schemeClr val="accent1">
+                    <a:lumMod val="75000"/>
+                  </a:schemeClr>
+                </a:solidFill>
+              </a:rPr>
               <a:t>];</a:t>
             </a:r>
           </a:p>
@@ -25572,7 +25613,7 @@
           <a:p>
             <a:fld id="{B8ECF4B1-F230-4767-9D40-08A350DFB7D7}" type="datetime1">
               <a:rPr lang="de-DE" smtClean="0"/>
-              <a:t>30.03.2022</a:t>
+              <a:t>05.10.2022</a:t>
             </a:fld>
             <a:endParaRPr lang="de-DE"/>
           </a:p>
@@ -25863,7 +25904,7 @@
               <a:rPr lang="de-DE" dirty="0"/>
               <a:t>…</a:t>
             </a:r>
-            <a:br>
+            <a:r>
               <a:rPr lang="de-DE" b="1" dirty="0">
                 <a:solidFill>
                   <a:schemeClr val="accent1">
@@ -25871,8 +25912,9 @@
                   </a:schemeClr>
                 </a:solidFill>
               </a:rPr>
-            </a:br>
-            <a:r>
+              <a:t/>
+            </a:r>
+            <a:br>
               <a:rPr lang="de-DE" b="1" dirty="0">
                 <a:solidFill>
                   <a:schemeClr val="accent1">
@@ -25880,6 +25922,15 @@
                   </a:schemeClr>
                 </a:solidFill>
               </a:rPr>
+            </a:br>
+            <a:r>
+              <a:rPr lang="de-DE" b="1" dirty="0">
+                <a:solidFill>
+                  <a:schemeClr val="accent1">
+                    <a:lumMod val="75000"/>
+                  </a:schemeClr>
+                </a:solidFill>
+              </a:rPr>
               <a:t>}</a:t>
             </a:r>
           </a:p>
@@ -25908,7 +25959,7 @@
           <a:p>
             <a:fld id="{DFEB386C-A89C-4E71-8C7A-EB57A1CCB74F}" type="datetime1">
               <a:rPr lang="de-DE" smtClean="0"/>
-              <a:t>30.03.2022</a:t>
+              <a:t>05.10.2022</a:t>
             </a:fld>
             <a:endParaRPr lang="de-DE"/>
           </a:p>
@@ -26253,7 +26304,7 @@
           <a:p>
             <a:fld id="{E3A6C6BD-3868-452A-A2BD-92328FD8B4E8}" type="datetime1">
               <a:rPr lang="de-DE" smtClean="0"/>
-              <a:t>30.03.2022</a:t>
+              <a:t>05.10.2022</a:t>
             </a:fld>
             <a:endParaRPr lang="de-DE"/>
           </a:p>
@@ -26472,7 +26523,7 @@
           <a:p>
             <a:fld id="{B60FD287-29C3-4567-A3C8-1214880B52D5}" type="datetime1">
               <a:rPr lang="de-DE" smtClean="0"/>
-              <a:t>30.03.2022</a:t>
+              <a:t>05.10.2022</a:t>
             </a:fld>
             <a:endParaRPr lang="de-DE"/>
           </a:p>
@@ -26867,7 +26918,7 @@
           <a:p>
             <a:fld id="{172E1AE1-643D-418C-ACE4-F2637FAE5286}" type="datetime1">
               <a:rPr lang="de-DE" smtClean="0"/>
-              <a:t>30.03.2022</a:t>
+              <a:t>05.10.2022</a:t>
             </a:fld>
             <a:endParaRPr lang="de-DE"/>
           </a:p>
@@ -27180,7 +27231,7 @@
           <a:p>
             <a:fld id="{C74E5831-6EC7-46CD-950B-539BB31CC002}" type="datetime1">
               <a:rPr lang="de-DE" smtClean="0"/>
-              <a:t>30.03.2022</a:t>
+              <a:t>05.10.2022</a:t>
             </a:fld>
             <a:endParaRPr lang="de-DE"/>
           </a:p>
@@ -27809,7 +27860,7 @@
           <a:p>
             <a:fld id="{0C2E1D0D-BBB0-4269-8DC7-C28B8DA8D26F}" type="datetime1">
               <a:rPr lang="de-DE" smtClean="0"/>
-              <a:t>30.03.2022</a:t>
+              <a:t>05.10.2022</a:t>
             </a:fld>
             <a:endParaRPr lang="de-DE"/>
           </a:p>
@@ -28117,7 +28168,7 @@
           <a:p>
             <a:fld id="{509B9FD4-6125-48DF-AAFB-8A90591F704C}" type="datetime1">
               <a:rPr lang="de-DE" smtClean="0"/>
-              <a:t>30.03.2022</a:t>
+              <a:t>05.10.2022</a:t>
             </a:fld>
             <a:endParaRPr lang="de-DE"/>
           </a:p>
@@ -28393,7 +28444,7 @@
           <a:p>
             <a:fld id="{5E005D36-C238-4437-9368-75EE1209248D}" type="datetime1">
               <a:rPr lang="de-DE" smtClean="0"/>
-              <a:t>30.03.2022</a:t>
+              <a:t>05.10.2022</a:t>
             </a:fld>
             <a:endParaRPr lang="de-DE"/>
           </a:p>
@@ -28573,7 +28624,7 @@
           <a:p>
             <a:fld id="{21A4D148-919D-4643-B21F-50F1B7EF8BA2}" type="datetime1">
               <a:rPr lang="de-DE" smtClean="0"/>
-              <a:t>30.03.2022</a:t>
+              <a:t>05.10.2022</a:t>
             </a:fld>
             <a:endParaRPr lang="de-DE"/>
           </a:p>
@@ -28978,7 +29029,7 @@
           <a:p>
             <a:fld id="{A3D84A41-9102-4FAF-BB9B-7AD126A78344}" type="datetime1">
               <a:rPr lang="de-DE" smtClean="0"/>
-              <a:t>30.03.2022</a:t>
+              <a:t>05.10.2022</a:t>
             </a:fld>
             <a:endParaRPr lang="de-DE"/>
           </a:p>
@@ -29588,7 +29639,7 @@
           <a:p>
             <a:fld id="{81CA66B2-419B-4A00-B550-DA1493185108}" type="datetime1">
               <a:rPr lang="de-DE" smtClean="0"/>
-              <a:t>30.03.2022</a:t>
+              <a:t>05.10.2022</a:t>
             </a:fld>
             <a:endParaRPr lang="de-DE"/>
           </a:p>
@@ -30291,6 +30342,16 @@
               <a:rPr lang="de-DE" dirty="0" err="1"/>
               <a:t>required</a:t>
             </a:r>
+            <a:r>
+              <a:rPr lang="de-DE" sz="2400" b="1" dirty="0">
+                <a:solidFill>
+                  <a:schemeClr val="accent1">
+                    <a:lumMod val="75000"/>
+                  </a:schemeClr>
+                </a:solidFill>
+              </a:rPr>
+              <a:t/>
+            </a:r>
             <a:br>
               <a:rPr lang="de-DE" sz="2400" b="1" dirty="0">
                 <a:solidFill>
@@ -30349,7 +30410,7 @@
               <a:rPr lang="de-DE" dirty="0"/>
               <a:t>Oder mit Standardwert</a:t>
             </a:r>
-            <a:br>
+            <a:r>
               <a:rPr lang="de-DE" b="1" dirty="0">
                 <a:solidFill>
                   <a:schemeClr val="accent1">
@@ -30357,6 +30418,16 @@
                   </a:schemeClr>
                 </a:solidFill>
               </a:rPr>
+              <a:t/>
+            </a:r>
+            <a:br>
+              <a:rPr lang="de-DE" b="1" dirty="0">
+                <a:solidFill>
+                  <a:schemeClr val="accent1">
+                    <a:lumMod val="75000"/>
+                  </a:schemeClr>
+                </a:solidFill>
+              </a:rPr>
             </a:br>
             <a:r>
               <a:rPr lang="de-DE" sz="2800" b="1" i="1" dirty="0">
@@ -30417,7 +30488,7 @@
           <a:p>
             <a:fld id="{374AF400-B2B3-4498-869C-65158B84F62E}" type="datetime1">
               <a:rPr lang="de-DE" smtClean="0"/>
-              <a:t>30.03.2022</a:t>
+              <a:t>05.10.2022</a:t>
             </a:fld>
             <a:endParaRPr lang="de-DE"/>
           </a:p>
@@ -30627,7 +30698,7 @@
           <a:p>
             <a:fld id="{EECFBCB7-6E51-47D1-88C0-70C111ACD504}" type="datetime1">
               <a:rPr lang="de-DE" smtClean="0"/>
-              <a:t>30.03.2022</a:t>
+              <a:t>05.10.2022</a:t>
             </a:fld>
             <a:endParaRPr lang="de-DE"/>
           </a:p>
@@ -31065,7 +31136,7 @@
           <a:p>
             <a:fld id="{284F0D45-833B-4CA2-95DA-AFDB6EDAE49B}" type="datetime1">
               <a:rPr lang="de-DE" smtClean="0"/>
-              <a:t>30.03.2022</a:t>
+              <a:t>05.10.2022</a:t>
             </a:fld>
             <a:endParaRPr lang="de-DE"/>
           </a:p>
@@ -31365,7 +31436,7 @@
           <a:p>
             <a:fld id="{F8D4647A-5A37-41ED-945E-4016D17F713F}" type="datetime1">
               <a:rPr lang="de-DE" smtClean="0"/>
-              <a:t>30.03.2022</a:t>
+              <a:t>05.10.2022</a:t>
             </a:fld>
             <a:endParaRPr lang="de-DE"/>
           </a:p>
@@ -31607,7 +31678,7 @@
           <a:p>
             <a:fld id="{040A1E27-A9C0-4EC9-BE62-C00CB62B7D24}" type="datetime1">
               <a:rPr lang="de-DE" smtClean="0"/>
-              <a:t>30.03.2022</a:t>
+              <a:t>05.10.2022</a:t>
             </a:fld>
             <a:endParaRPr lang="de-DE"/>
           </a:p>
@@ -31818,7 +31889,7 @@
           <a:p>
             <a:fld id="{8159FE7A-07D2-4D3F-9855-29B7F3DF1D43}" type="datetime1">
               <a:rPr lang="de-DE" smtClean="0"/>
-              <a:t>30.03.2022</a:t>
+              <a:t>05.10.2022</a:t>
             </a:fld>
             <a:endParaRPr lang="de-DE"/>
           </a:p>
@@ -32784,7 +32855,7 @@
           <a:p>
             <a:fld id="{8159FE7A-07D2-4D3F-9855-29B7F3DF1D43}" type="datetime1">
               <a:rPr lang="de-DE" smtClean="0"/>
-              <a:t>30.03.2022</a:t>
+              <a:t>05.10.2022</a:t>
             </a:fld>
             <a:endParaRPr lang="de-DE"/>
           </a:p>
@@ -33563,7 +33634,7 @@
           <a:p>
             <a:fld id="{8159FE7A-07D2-4D3F-9855-29B7F3DF1D43}" type="datetime1">
               <a:rPr lang="de-DE" smtClean="0"/>
-              <a:t>30.03.2022</a:t>
+              <a:t>05.10.2022</a:t>
             </a:fld>
             <a:endParaRPr lang="de-DE"/>
           </a:p>
@@ -34313,7 +34384,7 @@
           <a:p>
             <a:fld id="{8159FE7A-07D2-4D3F-9855-29B7F3DF1D43}" type="datetime1">
               <a:rPr lang="de-DE" smtClean="0"/>
-              <a:t>30.03.2022</a:t>
+              <a:t>05.10.2022</a:t>
             </a:fld>
             <a:endParaRPr lang="de-DE"/>
           </a:p>
@@ -34574,7 +34645,7 @@
           <a:p>
             <a:fld id="{BC1A8AC8-5070-4C02-8E82-DE4FD3F8497A}" type="datetime1">
               <a:rPr lang="de-DE" smtClean="0"/>
-              <a:t>30.03.2022</a:t>
+              <a:t>05.10.2022</a:t>
             </a:fld>
             <a:endParaRPr lang="de-DE"/>
           </a:p>
@@ -34887,7 +34958,7 @@
           <a:p>
             <a:fld id="{AF1CB7BF-E60D-47C9-99CD-43B03711F834}" type="datetime1">
               <a:rPr lang="de-DE" smtClean="0"/>
-              <a:t>30.03.2022</a:t>
+              <a:t>05.10.2022</a:t>
             </a:fld>
             <a:endParaRPr lang="de-DE"/>
           </a:p>
@@ -35096,7 +35167,7 @@
           <a:p>
             <a:fld id="{B9053FEB-F038-4EB7-B9DC-77977117EA33}" type="datetime1">
               <a:rPr lang="de-DE" smtClean="0"/>
-              <a:t>30.03.2022</a:t>
+              <a:t>05.10.2022</a:t>
             </a:fld>
             <a:endParaRPr lang="de-DE"/>
           </a:p>
@@ -35656,7 +35727,7 @@
           <a:p>
             <a:fld id="{0B399FA5-2F01-416C-865E-705C1E0C03C8}" type="datetime1">
               <a:rPr lang="de-DE" smtClean="0"/>
-              <a:t>30.03.2022</a:t>
+              <a:t>05.10.2022</a:t>
             </a:fld>
             <a:endParaRPr lang="de-DE"/>
           </a:p>
@@ -36139,7 +36210,7 @@
           <a:p>
             <a:fld id="{D7CFAA5B-8ED2-4D87-B5CD-876772B506EB}" type="datetime1">
               <a:rPr lang="de-DE" smtClean="0"/>
-              <a:t>30.03.2022</a:t>
+              <a:t>05.10.2022</a:t>
             </a:fld>
             <a:endParaRPr lang="de-DE"/>
           </a:p>
@@ -36613,7 +36684,7 @@
           <a:p>
             <a:fld id="{706CFF74-9D82-4823-AFE2-CBE8D2D808FC}" type="datetime1">
               <a:rPr lang="de-DE" smtClean="0"/>
-              <a:t>30.03.2022</a:t>
+              <a:t>05.10.2022</a:t>
             </a:fld>
             <a:endParaRPr lang="de-DE"/>
           </a:p>
@@ -36884,7 +36955,7 @@
           <a:p>
             <a:fld id="{5C03BAA7-20D5-4E1B-8CB5-A2ED8F9EFD7F}" type="datetime1">
               <a:rPr lang="de-DE" smtClean="0"/>
-              <a:t>30.03.2022</a:t>
+              <a:t>05.10.2022</a:t>
             </a:fld>
             <a:endParaRPr lang="de-DE"/>
           </a:p>
@@ -37083,7 +37154,7 @@
           <a:p>
             <a:fld id="{DF7C2B1F-6E2C-496E-BFF9-7CD4B274FE9C}" type="datetime1">
               <a:rPr lang="de-DE" smtClean="0"/>
-              <a:t>30.03.2022</a:t>
+              <a:t>05.10.2022</a:t>
             </a:fld>
             <a:endParaRPr lang="de-DE"/>
           </a:p>
@@ -37323,7 +37394,7 @@
           <a:p>
             <a:fld id="{8159FE7A-07D2-4D3F-9855-29B7F3DF1D43}" type="datetime1">
               <a:rPr lang="de-DE" smtClean="0"/>
-              <a:t>30.03.2022</a:t>
+              <a:t>05.10.2022</a:t>
             </a:fld>
             <a:endParaRPr lang="de-DE"/>
           </a:p>
@@ -37817,7 +37888,7 @@
           <a:p>
             <a:fld id="{8159FE7A-07D2-4D3F-9855-29B7F3DF1D43}" type="datetime1">
               <a:rPr lang="de-DE" smtClean="0"/>
-              <a:t>30.03.2022</a:t>
+              <a:t>05.10.2022</a:t>
             </a:fld>
             <a:endParaRPr lang="de-DE"/>
           </a:p>
@@ -38208,7 +38279,7 @@
           <a:p>
             <a:fld id="{8159FE7A-07D2-4D3F-9855-29B7F3DF1D43}" type="datetime1">
               <a:rPr lang="de-DE" smtClean="0"/>
-              <a:t>30.03.2022</a:t>
+              <a:t>05.10.2022</a:t>
             </a:fld>
             <a:endParaRPr lang="de-DE"/>
           </a:p>
@@ -38626,7 +38697,7 @@
           <a:p>
             <a:fld id="{8159FE7A-07D2-4D3F-9855-29B7F3DF1D43}" type="datetime1">
               <a:rPr lang="de-DE" smtClean="0"/>
-              <a:t>30.03.2022</a:t>
+              <a:t>05.10.2022</a:t>
             </a:fld>
             <a:endParaRPr lang="de-DE"/>
           </a:p>
@@ -39585,7 +39656,7 @@
           <a:p>
             <a:fld id="{8159FE7A-07D2-4D3F-9855-29B7F3DF1D43}" type="datetime1">
               <a:rPr lang="de-DE" smtClean="0"/>
-              <a:t>30.03.2022</a:t>
+              <a:t>05.10.2022</a:t>
             </a:fld>
             <a:endParaRPr lang="de-DE"/>
           </a:p>
@@ -39899,7 +39970,7 @@
           <a:p>
             <a:fld id="{8159FE7A-07D2-4D3F-9855-29B7F3DF1D43}" type="datetime1">
               <a:rPr lang="de-DE" smtClean="0"/>
-              <a:t>30.03.2022</a:t>
+              <a:t>05.10.2022</a:t>
             </a:fld>
             <a:endParaRPr lang="de-DE"/>
           </a:p>
@@ -40218,7 +40289,7 @@
           <a:p>
             <a:fld id="{B1DC90A9-3629-4532-90FF-C4E33F6085C7}" type="datetime1">
               <a:rPr lang="de-DE" smtClean="0"/>
-              <a:t>30.03.2022</a:t>
+              <a:t>05.10.2022</a:t>
             </a:fld>
             <a:endParaRPr lang="de-DE"/>
           </a:p>
@@ -40369,7 +40440,7 @@
           <a:blip r:embed="rId3">
             <a:extLst>
               <a:ext uri="{96DAC541-7B7A-43D3-8B79-37D633B846F1}">
-                <asvg:svgBlip xmlns:asvg="http://schemas.microsoft.com/office/drawing/2016/SVG/main" r:embed="rId4"/>
+                <asvg:svgBlip xmlns:asvg="http://schemas.microsoft.com/office/drawing/2016/SVG/main" xmlns="" r:embed="rId4"/>
               </a:ext>
             </a:extLst>
           </a:blip>
@@ -40405,7 +40476,7 @@
           <a:blip r:embed="rId5">
             <a:extLst>
               <a:ext uri="{96DAC541-7B7A-43D3-8B79-37D633B846F1}">
-                <asvg:svgBlip xmlns:asvg="http://schemas.microsoft.com/office/drawing/2016/SVG/main" r:embed="rId6"/>
+                <asvg:svgBlip xmlns:asvg="http://schemas.microsoft.com/office/drawing/2016/SVG/main" xmlns="" r:embed="rId6"/>
               </a:ext>
             </a:extLst>
           </a:blip>
@@ -40818,7 +40889,7 @@
           <a:p>
             <a:fld id="{23613DF9-A7E5-45FC-950B-BCC0B949EAE8}" type="datetime1">
               <a:rPr lang="de-DE" smtClean="0"/>
-              <a:t>30.03.2022</a:t>
+              <a:t>05.10.2022</a:t>
             </a:fld>
             <a:endParaRPr lang="de-DE"/>
           </a:p>
@@ -41001,7 +41072,7 @@
           <a:p>
             <a:fld id="{52EDD6C4-E3A8-4042-BB5D-CDA1A571A185}" type="datetime1">
               <a:rPr lang="de-DE" smtClean="0"/>
-              <a:t>30.03.2022</a:t>
+              <a:t>05.10.2022</a:t>
             </a:fld>
             <a:endParaRPr lang="de-DE"/>
           </a:p>
@@ -41542,7 +41613,7 @@
           <a:p>
             <a:fld id="{DDF7F67B-F411-40A4-BFC4-67CF6BB150A8}" type="datetime1">
               <a:rPr lang="de-DE" smtClean="0"/>
-              <a:t>30.03.2022</a:t>
+              <a:t>05.10.2022</a:t>
             </a:fld>
             <a:endParaRPr lang="de-DE"/>
           </a:p>
@@ -41708,7 +41779,7 @@
                 <a14:useLocalDpi xmlns:a14="http://schemas.microsoft.com/office/drawing/2010/main" val="0"/>
               </a:ext>
               <a:ext uri="{96DAC541-7B7A-43D3-8B79-37D633B846F1}">
-                <asvg:svgBlip xmlns:asvg="http://schemas.microsoft.com/office/drawing/2016/SVG/main" r:embed="rId7"/>
+                <asvg:svgBlip xmlns:asvg="http://schemas.microsoft.com/office/drawing/2016/SVG/main" xmlns="" r:embed="rId7"/>
               </a:ext>
             </a:extLst>
           </a:blip>
@@ -41886,7 +41957,7 @@
           <a:p>
             <a:fld id="{0A4B30BD-3EA6-4E11-8FCF-965C309E549A}" type="datetime1">
               <a:rPr lang="de-DE" smtClean="0"/>
-              <a:t>30.03.2022</a:t>
+              <a:t>05.10.2022</a:t>
             </a:fld>
             <a:endParaRPr lang="de-DE"/>
           </a:p>
@@ -42091,7 +42162,7 @@
           <a:p>
             <a:fld id="{DC040C72-25B9-466A-8F50-EBEC34934428}" type="datetime1">
               <a:rPr lang="de-DE" smtClean="0"/>
-              <a:t>30.03.2022</a:t>
+              <a:t>05.10.2022</a:t>
             </a:fld>
             <a:endParaRPr lang="de-DE"/>
           </a:p>
@@ -42572,7 +42643,7 @@
           <a:p>
             <a:fld id="{D285A436-1444-4657-AC1F-E488FE3B222B}" type="datetime1">
               <a:rPr lang="de-DE" smtClean="0"/>
-              <a:t>30.03.2022</a:t>
+              <a:t>05.10.2022</a:t>
             </a:fld>
             <a:endParaRPr lang="de-DE"/>
           </a:p>
@@ -42871,7 +42942,7 @@
           <a:p>
             <a:fld id="{93D272A3-5ACD-4745-88C6-1454260DA419}" type="datetime1">
               <a:rPr lang="de-DE" smtClean="0"/>
-              <a:t>30.03.2022</a:t>
+              <a:t>05.10.2022</a:t>
             </a:fld>
             <a:endParaRPr lang="de-DE"/>
           </a:p>
@@ -44020,7 +44091,7 @@
           <a:p>
             <a:fld id="{40518CB0-8C60-4E9D-9D73-72C22CA560A6}" type="datetime1">
               <a:rPr lang="de-DE" smtClean="0"/>
-              <a:t>30.03.2022</a:t>
+              <a:t>05.10.2022</a:t>
             </a:fld>
             <a:endParaRPr lang="de-DE"/>
           </a:p>
@@ -44343,7 +44414,7 @@
           <a:p>
             <a:fld id="{CC68D73E-E1AC-4A78-BFE5-D11401939CB4}" type="datetime1">
               <a:rPr lang="de-DE" smtClean="0"/>
-              <a:t>30.03.2022</a:t>
+              <a:t>05.10.2022</a:t>
             </a:fld>
             <a:endParaRPr lang="de-DE"/>
           </a:p>
@@ -45425,7 +45496,7 @@
           <a:p>
             <a:fld id="{6F2D9553-3793-4073-884D-343164046EA8}" type="datetime1">
               <a:rPr lang="de-DE" smtClean="0"/>
-              <a:t>30.03.2022</a:t>
+              <a:t>05.10.2022</a:t>
             </a:fld>
             <a:endParaRPr lang="de-DE"/>
           </a:p>
@@ -45900,7 +45971,7 @@
           <a:p>
             <a:fld id="{B5791953-A376-4A7E-8677-AAB812D71689}" type="datetime1">
               <a:rPr lang="de-DE" smtClean="0"/>
-              <a:t>30.03.2022</a:t>
+              <a:t>05.10.2022</a:t>
             </a:fld>
             <a:endParaRPr lang="de-DE"/>
           </a:p>
@@ -46046,6 +46117,10 @@
             <a:br>
               <a:rPr lang="de-DE" dirty="0"/>
             </a:br>
+            <a:r>
+              <a:rPr lang="de-DE" dirty="0"/>
+              <a:t/>
+            </a:r>
             <a:br>
               <a:rPr lang="de-DE" dirty="0"/>
             </a:br>
@@ -46107,7 +46182,7 @@
           <a:p>
             <a:fld id="{5B795128-38A1-4494-B687-FA4BAF969426}" type="datetime1">
               <a:rPr lang="de-DE" smtClean="0"/>
-              <a:t>30.03.2022</a:t>
+              <a:t>05.10.2022</a:t>
             </a:fld>
             <a:endParaRPr lang="de-DE"/>
           </a:p>
@@ -46301,7 +46376,7 @@
           <a:p>
             <a:fld id="{5F4637E3-489C-402C-9745-FC1C6A002798}" type="datetime1">
               <a:rPr lang="de-DE" smtClean="0"/>
-              <a:t>30.03.2022</a:t>
+              <a:t>05.10.2022</a:t>
             </a:fld>
             <a:endParaRPr lang="de-DE"/>
           </a:p>
@@ -46540,7 +46615,7 @@
           <a:p>
             <a:fld id="{96C0D114-F0DB-443F-9337-40D84E177FDC}" type="datetime1">
               <a:rPr lang="de-DE" smtClean="0"/>
-              <a:t>30.03.2022</a:t>
+              <a:t>05.10.2022</a:t>
             </a:fld>
             <a:endParaRPr lang="de-DE"/>
           </a:p>
@@ -46738,7 +46813,7 @@
           <a:p>
             <a:fld id="{DC9D7DCD-D634-4B62-9FA2-4E9A76968B39}" type="datetime1">
               <a:rPr lang="de-DE" smtClean="0"/>
-              <a:t>30.03.2022</a:t>
+              <a:t>05.10.2022</a:t>
             </a:fld>
             <a:endParaRPr lang="de-DE"/>
           </a:p>
@@ -47016,6 +47091,16 @@
             <a:r>
               <a:rPr lang="de-DE" dirty="0"/>
               <a:t>oder</a:t>
+            </a:r>
+            <a:r>
+              <a:rPr lang="de-DE" sz="2400" b="1" dirty="0">
+                <a:solidFill>
+                  <a:schemeClr val="accent1">
+                    <a:lumMod val="75000"/>
+                  </a:schemeClr>
+                </a:solidFill>
+              </a:rPr>
+              <a:t/>
             </a:r>
             <a:br>
               <a:rPr lang="de-DE" sz="2400" b="1" dirty="0">
@@ -47243,7 +47328,7 @@
           <a:p>
             <a:fld id="{3665ADD3-A45B-4AFB-ADB5-8849ACC19EEF}" type="datetime1">
               <a:rPr lang="de-DE" smtClean="0"/>
-              <a:t>30.03.2022</a:t>
+              <a:t>05.10.2022</a:t>
             </a:fld>
             <a:endParaRPr lang="de-DE"/>
           </a:p>
@@ -47457,6 +47542,10 @@
               </a:rPr>
               <a:t>() {</a:t>
             </a:r>
+            <a:r>
+              <a:rPr lang="de-DE" i="1" dirty="0"/>
+              <a:t/>
+            </a:r>
             <a:br>
               <a:rPr lang="de-DE" i="1" dirty="0"/>
             </a:br>
@@ -47474,6 +47563,10 @@
               </a:rPr>
               <a:t>// hier irgendwas tun</a:t>
             </a:r>
+            <a:r>
+              <a:rPr lang="de-DE" i="1" dirty="0"/>
+              <a:t/>
+            </a:r>
             <a:br>
               <a:rPr lang="de-DE" i="1" dirty="0"/>
             </a:br>
@@ -47486,6 +47579,10 @@
                 </a:solidFill>
               </a:rPr>
               <a:t>    }</a:t>
+            </a:r>
+            <a:r>
+              <a:rPr lang="de-DE" i="1" dirty="0"/>
+              <a:t/>
             </a:r>
             <a:br>
               <a:rPr lang="de-DE" i="1" dirty="0"/>
@@ -47591,7 +47688,7 @@
           <a:p>
             <a:fld id="{DD8B8171-21DA-4907-A9C5-6774B32408EF}" type="datetime1">
               <a:rPr lang="de-DE" smtClean="0"/>
-              <a:t>30.03.2022</a:t>
+              <a:t>05.10.2022</a:t>
             </a:fld>
             <a:endParaRPr lang="de-DE"/>
           </a:p>
@@ -47849,6 +47946,10 @@
               </a:rPr>
               <a:t>// Eigenschaft, die gleich einen Wert hat</a:t>
             </a:r>
+            <a:r>
+              <a:rPr lang="de-DE" i="1" dirty="0"/>
+              <a:t/>
+            </a:r>
             <a:br>
               <a:rPr lang="de-DE" i="1" dirty="0"/>
             </a:br>
@@ -47923,6 +48024,10 @@
                 </a:solidFill>
               </a:rPr>
             </a:br>
+            <a:r>
+              <a:rPr lang="de-DE" i="1" dirty="0"/>
+              <a:t/>
+            </a:r>
             <a:br>
               <a:rPr lang="de-DE" i="1" dirty="0"/>
             </a:br>
@@ -47984,6 +48089,10 @@
               </a:rPr>
               <a:t>) {</a:t>
             </a:r>
+            <a:r>
+              <a:rPr lang="de-DE" i="1" dirty="0"/>
+              <a:t/>
+            </a:r>
             <a:br>
               <a:rPr lang="de-DE" i="1" dirty="0"/>
             </a:br>
@@ -48037,6 +48146,10 @@
               </a:rPr>
               <a:t>// Jetzt hat sie einen Wert</a:t>
             </a:r>
+            <a:r>
+              <a:rPr lang="de-DE" i="1" dirty="0"/>
+              <a:t/>
+            </a:r>
             <a:br>
               <a:rPr lang="de-DE" i="1" dirty="0"/>
             </a:br>
@@ -48050,6 +48163,10 @@
               </a:rPr>
               <a:t>    }</a:t>
             </a:r>
+            <a:r>
+              <a:rPr lang="de-DE" i="1" dirty="0"/>
+              <a:t/>
+            </a:r>
             <a:br>
               <a:rPr lang="de-DE" i="1" dirty="0"/>
             </a:br>
@@ -48084,7 +48201,7 @@
           <a:p>
             <a:fld id="{1B9B7D4F-084D-4938-987D-2F1AC790542C}" type="datetime1">
               <a:rPr lang="de-DE" smtClean="0"/>
-              <a:t>30.03.2022</a:t>
+              <a:t>05.10.2022</a:t>
             </a:fld>
             <a:endParaRPr lang="de-DE"/>
           </a:p>
@@ -48465,7 +48582,7 @@
           <a:p>
             <a:fld id="{9B861850-1CC1-4EA2-B13E-5F4984DD6765}" type="datetime1">
               <a:rPr lang="de-DE" smtClean="0"/>
-              <a:t>30.03.2022</a:t>
+              <a:t>05.10.2022</a:t>
             </a:fld>
             <a:endParaRPr lang="de-DE"/>
           </a:p>
@@ -48691,7 +48808,7 @@
           <a:p>
             <a:fld id="{889CA5D6-219F-4100-8B22-6093808BA88C}" type="datetime1">
               <a:rPr lang="de-DE" smtClean="0"/>
-              <a:t>30.03.2022</a:t>
+              <a:t>05.10.2022</a:t>
             </a:fld>
             <a:endParaRPr lang="de-DE"/>
           </a:p>
@@ -48887,7 +49004,7 @@
           <a:p>
             <a:fld id="{E3EA1E44-3556-4DD6-B627-361E1D69BC25}" type="datetime1">
               <a:rPr lang="de-DE" smtClean="0"/>
-              <a:t>30.03.2022</a:t>
+              <a:t>05.10.2022</a:t>
             </a:fld>
             <a:endParaRPr lang="de-DE"/>
           </a:p>
@@ -49050,7 +49167,7 @@
           <a:p>
             <a:fld id="{1540C555-F8A4-4422-9B93-FA0C3929592C}" type="datetime1">
               <a:rPr lang="de-DE" smtClean="0"/>
-              <a:t>30.03.2022</a:t>
+              <a:t>05.10.2022</a:t>
             </a:fld>
             <a:endParaRPr lang="de-DE"/>
           </a:p>
@@ -49886,7 +50003,7 @@
           <a:p>
             <a:fld id="{5B67CC1C-91AE-4741-BE88-3E8933D29597}" type="datetime1">
               <a:rPr lang="de-DE" smtClean="0"/>
-              <a:t>30.03.2022</a:t>
+              <a:t>05.10.2022</a:t>
             </a:fld>
             <a:endParaRPr lang="de-DE"/>
           </a:p>
@@ -50519,7 +50636,7 @@
           <a:p>
             <a:fld id="{3466B08E-FC5F-4F44-9AE8-540AFED46B32}" type="datetime1">
               <a:rPr lang="de-DE" smtClean="0"/>
-              <a:t>30.03.2022</a:t>
+              <a:t>05.10.2022</a:t>
             </a:fld>
             <a:endParaRPr lang="de-DE"/>
           </a:p>

</xml_diff>

<commit_message>
Add solutions to the notes on slide 70
</commit_message>
<xml_diff>
--- a/Dart.pptx
+++ b/Dart.pptx
@@ -6570,6 +6570,14 @@
           <a:bodyPr/>
           <a:lstStyle/>
           <a:p>
+            <a:r>
+              <a:rPr lang="de-DE" dirty="0" smtClean="0"/>
+              <a:t>Lösung:</a:t>
+            </a:r>
+            <a:r>
+              <a:rPr lang="de-DE" baseline="0" dirty="0" smtClean="0"/>
+              <a:t> 376.9</a:t>
+            </a:r>
             <a:endParaRPr lang="de-DE" dirty="0"/>
           </a:p>
         </p:txBody>
@@ -6660,7 +6668,41 @@
           <a:bodyPr/>
           <a:lstStyle/>
           <a:p>
-            <a:endParaRPr lang="de-DE" dirty="0"/>
+            <a:r>
+              <a:rPr lang="de-DE" dirty="0" smtClean="0"/>
+              <a:t>Lösung</a:t>
+            </a:r>
+            <a:endParaRPr lang="de-DE" baseline="0" dirty="0" smtClean="0"/>
+          </a:p>
+          <a:p>
+            <a:r>
+              <a:rPr lang="de-DE" baseline="0" dirty="0" smtClean="0"/>
+              <a:t>Kein Rabatt -&gt;	376.9</a:t>
+            </a:r>
+          </a:p>
+          <a:p>
+            <a:r>
+              <a:rPr lang="de-DE" baseline="0" dirty="0" smtClean="0"/>
+              <a:t>2% Skonto -&gt;	369.75999</a:t>
+            </a:r>
+          </a:p>
+          <a:p>
+            <a:r>
+              <a:rPr lang="de-DE" baseline="0" dirty="0" smtClean="0"/>
+              <a:t>VW:</a:t>
+            </a:r>
+          </a:p>
+          <a:p>
+            <a:r>
+              <a:rPr lang="de-DE" baseline="0" dirty="0" smtClean="0"/>
+              <a:t> - netto=300 -&gt; 362.61999</a:t>
+            </a:r>
+          </a:p>
+          <a:p>
+            <a:r>
+              <a:rPr lang="de-DE" baseline="0" dirty="0" smtClean="0"/>
+              <a:t> - netto=10000 -&gt; 11205.9</a:t>
+            </a:r>
           </a:p>
         </p:txBody>
       </p:sp>
@@ -30032,6 +30074,13 @@
   <p:clrMapOvr>
     <a:masterClrMapping/>
   </p:clrMapOvr>
+  <p:timing>
+    <p:tnLst>
+      <p:par>
+        <p:cTn id="1" dur="indefinite" restart="never" nodeType="tmRoot"/>
+      </p:par>
+    </p:tnLst>
+  </p:timing>
 </p:sld>
 </file>
 
@@ -30561,6 +30610,13 @@
   <p:clrMapOvr>
     <a:masterClrMapping/>
   </p:clrMapOvr>
+  <p:timing>
+    <p:tnLst>
+      <p:par>
+        <p:cTn id="1" dur="indefinite" restart="never" nodeType="tmRoot"/>
+      </p:par>
+    </p:tnLst>
+  </p:timing>
 </p:sld>
 </file>
 
@@ -31268,6 +31324,13 @@
   <p:clrMapOvr>
     <a:masterClrMapping/>
   </p:clrMapOvr>
+  <p:timing>
+    <p:tnLst>
+      <p:par>
+        <p:cTn id="1" dur="indefinite" restart="never" nodeType="tmRoot"/>
+      </p:par>
+    </p:tnLst>
+  </p:timing>
 </p:sld>
 </file>
 
@@ -31509,6 +31572,13 @@
   <p:clrMapOvr>
     <a:masterClrMapping/>
   </p:clrMapOvr>
+  <p:timing>
+    <p:tnLst>
+      <p:par>
+        <p:cTn id="1" dur="indefinite" restart="never" nodeType="tmRoot"/>
+      </p:par>
+    </p:tnLst>
+  </p:timing>
 </p:sld>
 </file>
 
@@ -34517,6 +34587,13 @@
   <p:clrMapOvr>
     <a:masterClrMapping/>
   </p:clrMapOvr>
+  <p:timing>
+    <p:tnLst>
+      <p:par>
+        <p:cTn id="1" dur="indefinite" restart="never" nodeType="tmRoot"/>
+      </p:par>
+    </p:tnLst>
+  </p:timing>
 </p:sld>
 </file>
 
@@ -34803,6 +34880,13 @@
   <p:clrMapOvr>
     <a:masterClrMapping/>
   </p:clrMapOvr>
+  <p:timing>
+    <p:tnLst>
+      <p:par>
+        <p:cTn id="1" dur="indefinite" restart="never" nodeType="tmRoot"/>
+      </p:par>
+    </p:tnLst>
+  </p:timing>
 </p:sld>
 </file>
 
@@ -35091,6 +35175,13 @@
   <p:clrMapOvr>
     <a:masterClrMapping/>
   </p:clrMapOvr>
+  <p:timing>
+    <p:tnLst>
+      <p:par>
+        <p:cTn id="1" dur="indefinite" restart="never" nodeType="tmRoot"/>
+      </p:par>
+    </p:tnLst>
+  </p:timing>
 </p:sld>
 </file>
 
@@ -35586,6 +35677,13 @@
   <p:clrMapOvr>
     <a:masterClrMapping/>
   </p:clrMapOvr>
+  <p:timing>
+    <p:tnLst>
+      <p:par>
+        <p:cTn id="1" dur="indefinite" restart="never" nodeType="tmRoot"/>
+      </p:par>
+    </p:tnLst>
+  </p:timing>
 </p:sld>
 </file>
 
@@ -36550,6 +36648,13 @@
   <p:clrMapOvr>
     <a:masterClrMapping/>
   </p:clrMapOvr>
+  <p:timing>
+    <p:tnLst>
+      <p:par>
+        <p:cTn id="1" dur="indefinite" restart="never" nodeType="tmRoot"/>
+      </p:par>
+    </p:tnLst>
+  </p:timing>
 </p:sld>
 </file>
 
@@ -36757,6 +36862,13 @@
   <p:clrMapOvr>
     <a:masterClrMapping/>
   </p:clrMapOvr>
+  <p:timing>
+    <p:tnLst>
+      <p:par>
+        <p:cTn id="1" dur="indefinite" restart="never" nodeType="tmRoot"/>
+      </p:par>
+    </p:tnLst>
+  </p:timing>
 </p:sld>
 </file>
 
@@ -37257,6 +37369,13 @@
   <p:clrMapOvr>
     <a:masterClrMapping/>
   </p:clrMapOvr>
+  <p:timing>
+    <p:tnLst>
+      <p:par>
+        <p:cTn id="1" dur="indefinite" restart="never" nodeType="tmRoot"/>
+      </p:par>
+    </p:tnLst>
+  </p:timing>
 </p:sld>
 </file>
 
@@ -38151,6 +38270,13 @@
   <p:clrMapOvr>
     <a:masterClrMapping/>
   </p:clrMapOvr>
+  <p:timing>
+    <p:tnLst>
+      <p:par>
+        <p:cTn id="1" dur="indefinite" restart="never" nodeType="tmRoot"/>
+      </p:par>
+    </p:tnLst>
+  </p:timing>
 </p:sld>
 </file>
 
@@ -38586,6 +38712,13 @@
   <p:clrMapOvr>
     <a:masterClrMapping/>
   </p:clrMapOvr>
+  <p:timing>
+    <p:tnLst>
+      <p:par>
+        <p:cTn id="1" dur="indefinite" restart="never" nodeType="tmRoot"/>
+      </p:par>
+    </p:tnLst>
+  </p:timing>
 </p:sld>
 </file>
 
@@ -39585,6 +39718,13 @@
   <p:clrMapOvr>
     <a:masterClrMapping/>
   </p:clrMapOvr>
+  <p:timing>
+    <p:tnLst>
+      <p:par>
+        <p:cTn id="1" dur="indefinite" restart="never" nodeType="tmRoot"/>
+      </p:par>
+    </p:tnLst>
+  </p:timing>
 </p:sld>
 </file>
 
@@ -39867,6 +40007,13 @@
   <p:clrMapOvr>
     <a:masterClrMapping/>
   </p:clrMapOvr>
+  <p:timing>
+    <p:tnLst>
+      <p:par>
+        <p:cTn id="1" dur="indefinite" restart="never" nodeType="tmRoot"/>
+      </p:par>
+    </p:tnLst>
+  </p:timing>
 </p:sld>
 </file>
 
@@ -40181,6 +40328,13 @@
   <p:clrMapOvr>
     <a:masterClrMapping/>
   </p:clrMapOvr>
+  <p:timing>
+    <p:tnLst>
+      <p:par>
+        <p:cTn id="1" dur="indefinite" restart="never" nodeType="tmRoot"/>
+      </p:par>
+    </p:tnLst>
+  </p:timing>
 </p:sld>
 </file>
 
@@ -40440,7 +40594,7 @@
           <a:blip r:embed="rId3">
             <a:extLst>
               <a:ext uri="{96DAC541-7B7A-43D3-8B79-37D633B846F1}">
-                <asvg:svgBlip xmlns:asvg="http://schemas.microsoft.com/office/drawing/2016/SVG/main" xmlns="" r:embed="rId4"/>
+                <asvg:svgBlip xmlns="" xmlns:asvg="http://schemas.microsoft.com/office/drawing/2016/SVG/main" r:embed="rId4"/>
               </a:ext>
             </a:extLst>
           </a:blip>
@@ -40476,7 +40630,7 @@
           <a:blip r:embed="rId5">
             <a:extLst>
               <a:ext uri="{96DAC541-7B7A-43D3-8B79-37D633B846F1}">
-                <asvg:svgBlip xmlns:asvg="http://schemas.microsoft.com/office/drawing/2016/SVG/main" xmlns="" r:embed="rId6"/>
+                <asvg:svgBlip xmlns="" xmlns:asvg="http://schemas.microsoft.com/office/drawing/2016/SVG/main" r:embed="rId6"/>
               </a:ext>
             </a:extLst>
           </a:blip>
@@ -40583,6 +40737,13 @@
   <p:clrMapOvr>
     <a:masterClrMapping/>
   </p:clrMapOvr>
+  <p:timing>
+    <p:tnLst>
+      <p:par>
+        <p:cTn id="1" dur="indefinite" restart="never" nodeType="tmRoot"/>
+      </p:par>
+    </p:tnLst>
+  </p:timing>
 </p:sld>
 </file>
 
@@ -41779,7 +41940,7 @@
                 <a14:useLocalDpi xmlns:a14="http://schemas.microsoft.com/office/drawing/2010/main" val="0"/>
               </a:ext>
               <a:ext uri="{96DAC541-7B7A-43D3-8B79-37D633B846F1}">
-                <asvg:svgBlip xmlns:asvg="http://schemas.microsoft.com/office/drawing/2016/SVG/main" xmlns="" r:embed="rId7"/>
+                <asvg:svgBlip xmlns="" xmlns:asvg="http://schemas.microsoft.com/office/drawing/2016/SVG/main" r:embed="rId7"/>
               </a:ext>
             </a:extLst>
           </a:blip>

</xml_diff>

<commit_message>
Correct mistake 'and' to '&&' on slide 98 in Dart.pptx
</commit_message>
<xml_diff>
--- a/Dart.pptx
+++ b/Dart.pptx
@@ -40594,7 +40594,7 @@
           <a:blip r:embed="rId3">
             <a:extLst>
               <a:ext uri="{96DAC541-7B7A-43D3-8B79-37D633B846F1}">
-                <asvg:svgBlip xmlns="" xmlns:asvg="http://schemas.microsoft.com/office/drawing/2016/SVG/main" r:embed="rId4"/>
+                <asvg:svgBlip xmlns:asvg="http://schemas.microsoft.com/office/drawing/2016/SVG/main" xmlns="" r:embed="rId4"/>
               </a:ext>
             </a:extLst>
           </a:blip>
@@ -40630,7 +40630,7 @@
           <a:blip r:embed="rId5">
             <a:extLst>
               <a:ext uri="{96DAC541-7B7A-43D3-8B79-37D633B846F1}">
-                <asvg:svgBlip xmlns="" xmlns:asvg="http://schemas.microsoft.com/office/drawing/2016/SVG/main" r:embed="rId6"/>
+                <asvg:svgBlip xmlns:asvg="http://schemas.microsoft.com/office/drawing/2016/SVG/main" xmlns="" r:embed="rId6"/>
               </a:ext>
             </a:extLst>
           </a:blip>
@@ -41940,7 +41940,7 @@
                 <a14:useLocalDpi xmlns:a14="http://schemas.microsoft.com/office/drawing/2010/main" val="0"/>
               </a:ext>
               <a:ext uri="{96DAC541-7B7A-43D3-8B79-37D633B846F1}">
-                <asvg:svgBlip xmlns="" xmlns:asvg="http://schemas.microsoft.com/office/drawing/2016/SVG/main" r:embed="rId7"/>
+                <asvg:svgBlip xmlns:asvg="http://schemas.microsoft.com/office/drawing/2016/SVG/main" xmlns="" r:embed="rId7"/>
               </a:ext>
             </a:extLst>
           </a:blip>
@@ -49799,18 +49799,18 @@
               <a:t>true</a:t>
             </a:r>
             <a:r>
-              <a:rPr lang="de-DE" dirty="0"/>
+              <a:rPr lang="de-DE"/>
               <a:t> </a:t>
             </a:r>
             <a:r>
-              <a:rPr lang="de-DE" b="1" dirty="0">
+              <a:rPr lang="de-DE" b="1" smtClean="0">
                 <a:solidFill>
                   <a:schemeClr val="accent1">
                     <a:lumMod val="75000"/>
                   </a:schemeClr>
                 </a:solidFill>
               </a:rPr>
-              <a:t>and </a:t>
+              <a:t>&amp;&amp; </a:t>
             </a:r>
             <a:r>
               <a:rPr lang="de-DE" b="1" i="1" dirty="0">
@@ -50225,6 +50225,13 @@
   <p:clrMapOvr>
     <a:masterClrMapping/>
   </p:clrMapOvr>
+  <p:timing>
+    <p:tnLst>
+      <p:par>
+        <p:cTn id="1" dur="indefinite" restart="never" nodeType="tmRoot"/>
+      </p:par>
+    </p:tnLst>
+  </p:timing>
 </p:sld>
 </file>
 
@@ -50858,6 +50865,13 @@
   <p:clrMapOvr>
     <a:masterClrMapping/>
   </p:clrMapOvr>
+  <p:timing>
+    <p:tnLst>
+      <p:par>
+        <p:cTn id="1" dur="indefinite" restart="never" nodeType="tmRoot"/>
+      </p:par>
+    </p:tnLst>
+  </p:timing>
 </p:sld>
 </file>
 

</xml_diff>

<commit_message>
Kleinere Anpassungen bzgl. Formatierung
</commit_message>
<xml_diff>
--- a/Dart.pptx
+++ b/Dart.pptx
@@ -608,7 +608,7 @@
                   <a:schemeClr val="tx2"/>
                 </a:solidFill>
               </a:rPr>
-              <a:t>‹Nr.›</a:t>
+              <a:t>‹#›</a:t>
             </a:fld>
             <a:endParaRPr lang="de-DE">
               <a:solidFill>
@@ -1047,7 +1047,7 @@
             <a:fld id="{927DBD90-B360-417B-B4B3-F05A4AFC1996}" type="slidenum">
               <a:rPr lang="de-DE" smtClean="0"/>
               <a:pPr/>
-              <a:t>‹Nr.›</a:t>
+              <a:t>‹#›</a:t>
             </a:fld>
             <a:endParaRPr lang="de-DE"/>
           </a:p>
@@ -2431,11 +2431,7 @@
             </a:r>
             <a:r>
               <a:rPr lang="de-DE"/>
-              <a:t>ist </a:t>
-            </a:r>
-            <a:r>
-              <a:rPr lang="de-DE" smtClean="0"/>
-              <a:t>exklusive</a:t>
+              <a:t>ist exklusive</a:t>
             </a:r>
             <a:r>
               <a:rPr lang="de-DE" dirty="0"/>
@@ -6571,11 +6567,11 @@
           <a:lstStyle/>
           <a:p>
             <a:r>
-              <a:rPr lang="de-DE" dirty="0" smtClean="0"/>
+              <a:rPr lang="de-DE" dirty="0"/>
               <a:t>Lösung:</a:t>
             </a:r>
             <a:r>
-              <a:rPr lang="de-DE" baseline="0" dirty="0" smtClean="0"/>
+              <a:rPr lang="de-DE" baseline="0" dirty="0"/>
               <a:t> 376.9</a:t>
             </a:r>
             <a:endParaRPr lang="de-DE" dirty="0"/>
@@ -6669,38 +6665,38 @@
           <a:lstStyle/>
           <a:p>
             <a:r>
-              <a:rPr lang="de-DE" dirty="0" smtClean="0"/>
+              <a:rPr lang="de-DE" dirty="0"/>
               <a:t>Lösung</a:t>
             </a:r>
-            <a:endParaRPr lang="de-DE" baseline="0" dirty="0" smtClean="0"/>
-          </a:p>
-          <a:p>
-            <a:r>
-              <a:rPr lang="de-DE" baseline="0" dirty="0" smtClean="0"/>
+            <a:endParaRPr lang="de-DE" baseline="0" dirty="0"/>
+          </a:p>
+          <a:p>
+            <a:r>
+              <a:rPr lang="de-DE" baseline="0" dirty="0"/>
               <a:t>Kein Rabatt -&gt;	376.9</a:t>
             </a:r>
           </a:p>
           <a:p>
             <a:r>
-              <a:rPr lang="de-DE" baseline="0" dirty="0" smtClean="0"/>
+              <a:rPr lang="de-DE" baseline="0" dirty="0"/>
               <a:t>2% Skonto -&gt;	369.75999</a:t>
             </a:r>
           </a:p>
           <a:p>
             <a:r>
-              <a:rPr lang="de-DE" baseline="0" dirty="0" smtClean="0"/>
+              <a:rPr lang="de-DE" baseline="0" dirty="0"/>
               <a:t>VW:</a:t>
             </a:r>
           </a:p>
           <a:p>
             <a:r>
-              <a:rPr lang="de-DE" baseline="0" dirty="0" smtClean="0"/>
+              <a:rPr lang="de-DE" baseline="0" dirty="0"/>
               <a:t> - netto=300 -&gt; 362.61999</a:t>
             </a:r>
           </a:p>
           <a:p>
             <a:r>
-              <a:rPr lang="de-DE" baseline="0" dirty="0" smtClean="0"/>
+              <a:rPr lang="de-DE" baseline="0" dirty="0"/>
               <a:t> - netto=10000 -&gt; 11205.9</a:t>
             </a:r>
           </a:p>
@@ -9406,7 +9402,7 @@
           <a:p>
             <a:fld id="{3A1F27E2-D58A-4028-9FF2-B12D897F257E}" type="slidenum">
               <a:rPr lang="de-DE" smtClean="0"/>
-              <a:t>‹Nr.›</a:t>
+              <a:t>‹#›</a:t>
             </a:fld>
             <a:endParaRPr lang="de-DE"/>
           </a:p>
@@ -9611,7 +9607,7 @@
           <a:p>
             <a:fld id="{3A1F27E2-D58A-4028-9FF2-B12D897F257E}" type="slidenum">
               <a:rPr lang="de-DE" smtClean="0"/>
-              <a:t>‹Nr.›</a:t>
+              <a:t>‹#›</a:t>
             </a:fld>
             <a:endParaRPr lang="de-DE"/>
           </a:p>
@@ -9765,7 +9761,7 @@
           <a:p>
             <a:fld id="{3A1F27E2-D58A-4028-9FF2-B12D897F257E}" type="slidenum">
               <a:rPr lang="de-DE" smtClean="0"/>
-              <a:t>‹Nr.›</a:t>
+              <a:t>‹#›</a:t>
             </a:fld>
             <a:endParaRPr lang="de-DE"/>
           </a:p>
@@ -10002,7 +9998,7 @@
           <a:p>
             <a:fld id="{3A1F27E2-D58A-4028-9FF2-B12D897F257E}" type="slidenum">
               <a:rPr lang="de-DE" smtClean="0"/>
-              <a:t>‹Nr.›</a:t>
+              <a:t>‹#›</a:t>
             </a:fld>
             <a:endParaRPr lang="de-DE"/>
           </a:p>
@@ -10178,7 +10174,7 @@
           <a:p>
             <a:fld id="{3A1F27E2-D58A-4028-9FF2-B12D897F257E}" type="slidenum">
               <a:rPr lang="de-DE" smtClean="0"/>
-              <a:t>‹Nr.›</a:t>
+              <a:t>‹#›</a:t>
             </a:fld>
             <a:endParaRPr lang="de-DE"/>
           </a:p>
@@ -10354,7 +10350,7 @@
           <a:p>
             <a:fld id="{3A1F27E2-D58A-4028-9FF2-B12D897F257E}" type="slidenum">
               <a:rPr lang="de-DE" smtClean="0"/>
-              <a:t>‹Nr.›</a:t>
+              <a:t>‹#›</a:t>
             </a:fld>
             <a:endParaRPr lang="de-DE"/>
           </a:p>
@@ -10504,7 +10500,7 @@
           <a:p>
             <a:fld id="{3A1F27E2-D58A-4028-9FF2-B12D897F257E}" type="slidenum">
               <a:rPr lang="de-DE" smtClean="0"/>
-              <a:t>‹Nr.›</a:t>
+              <a:t>‹#›</a:t>
             </a:fld>
             <a:endParaRPr lang="de-DE"/>
           </a:p>
@@ -10602,7 +10598,7 @@
           <a:p>
             <a:fld id="{3A1F27E2-D58A-4028-9FF2-B12D897F257E}" type="slidenum">
               <a:rPr lang="de-DE" smtClean="0"/>
-              <a:t>‹Nr.›</a:t>
+              <a:t>‹#›</a:t>
             </a:fld>
             <a:endParaRPr lang="de-DE"/>
           </a:p>
@@ -10726,7 +10722,7 @@
           <a:p>
             <a:fld id="{3A1F27E2-D58A-4028-9FF2-B12D897F257E}" type="slidenum">
               <a:rPr lang="de-DE" smtClean="0"/>
-              <a:t>‹Nr.›</a:t>
+              <a:t>‹#›</a:t>
             </a:fld>
             <a:endParaRPr lang="de-DE"/>
           </a:p>
@@ -10910,7 +10906,7 @@
           <a:p>
             <a:fld id="{3A1F27E2-D58A-4028-9FF2-B12D897F257E}" type="slidenum">
               <a:rPr lang="de-DE" smtClean="0"/>
-              <a:t>‹Nr.›</a:t>
+              <a:t>‹#›</a:t>
             </a:fld>
             <a:endParaRPr lang="de-DE"/>
           </a:p>
@@ -11115,7 +11111,7 @@
           <a:p>
             <a:fld id="{3A1F27E2-D58A-4028-9FF2-B12D897F257E}" type="slidenum">
               <a:rPr lang="de-DE" smtClean="0"/>
-              <a:t>‹Nr.›</a:t>
+              <a:t>‹#›</a:t>
             </a:fld>
             <a:endParaRPr lang="de-DE"/>
           </a:p>
@@ -11515,7 +11511,7 @@
             <a:fld id="{3A1F27E2-D58A-4028-9FF2-B12D897F257E}" type="slidenum">
               <a:rPr lang="de-DE" smtClean="0"/>
               <a:pPr/>
-              <a:t>‹Nr.›</a:t>
+              <a:t>‹#›</a:t>
             </a:fld>
             <a:endParaRPr lang="de-DE"/>
           </a:p>
@@ -12156,7 +12152,7 @@
             <a:fld id="{3A1F27E2-D58A-4028-9FF2-B12D897F257E}" type="slidenum">
               <a:rPr lang="de-DE" smtClean="0"/>
               <a:pPr/>
-              <a:t>‹Nr.›</a:t>
+              <a:t>‹#›</a:t>
             </a:fld>
             <a:endParaRPr lang="de-DE" dirty="0"/>
           </a:p>
@@ -12802,13 +12798,6 @@
   <p:clrMapOvr>
     <a:masterClrMapping/>
   </p:clrMapOvr>
-  <p:timing>
-    <p:tnLst>
-      <p:par>
-        <p:cTn id="1" dur="indefinite" restart="never" nodeType="tmRoot"/>
-      </p:par>
-    </p:tnLst>
-  </p:timing>
 </p:sld>
 </file>
 
@@ -22436,10 +22425,6 @@
               </a:rPr>
               <a:t>) {</a:t>
             </a:r>
-            <a:r>
-              <a:rPr lang="de-DE" i="1" dirty="0"/>
-              <a:t/>
-            </a:r>
             <a:br>
               <a:rPr lang="de-DE" i="1" dirty="0"/>
             </a:br>
@@ -22538,10 +22523,6 @@
               </a:rPr>
               <a:t>) {</a:t>
             </a:r>
-            <a:r>
-              <a:rPr lang="de-DE" i="1" dirty="0"/>
-              <a:t/>
-            </a:r>
             <a:br>
               <a:rPr lang="de-DE" i="1" dirty="0"/>
             </a:br>
@@ -22599,10 +22580,6 @@
                 </a:solidFill>
               </a:rPr>
               <a:t> {</a:t>
-            </a:r>
-            <a:r>
-              <a:rPr lang="de-DE" dirty="0"/>
-              <a:t/>
             </a:r>
             <a:br>
               <a:rPr lang="de-DE" dirty="0"/>
@@ -25453,39 +25430,31 @@
                   <a:schemeClr val="tx2"/>
                 </a:solidFill>
               </a:rPr>
-              <a:t> = </a:t>
-            </a:r>
-            <a:r>
-              <a:rPr lang="de-DE" sz="2800" b="1" dirty="0">
+              <a:t> </a:t>
+            </a:r>
+            <a:r>
+              <a:rPr lang="de-DE" b="1" dirty="0">
                 <a:solidFill>
                   <a:schemeClr val="accent1">
                     <a:lumMod val="75000"/>
                   </a:schemeClr>
                 </a:solidFill>
               </a:rPr>
-              <a:t>{</a:t>
-            </a:r>
-            <a:r>
-              <a:rPr lang="de-DE" dirty="0"/>
-              <a:t> </a:t>
-            </a:r>
-            <a:r>
-              <a:rPr lang="de-DE" sz="2800" b="1" i="1" dirty="0" err="1">
-                <a:solidFill>
-                  <a:schemeClr val="tx2"/>
-                </a:solidFill>
-              </a:rPr>
-              <a:t>key</a:t>
-            </a:r>
-            <a:r>
-              <a:rPr lang="de-DE" sz="2800" b="1" dirty="0" err="1">
+              <a:t>= </a:t>
+            </a:r>
+            <a:r>
+              <a:rPr lang="de-DE" sz="2800" b="1" dirty="0">
                 <a:solidFill>
                   <a:schemeClr val="accent1">
                     <a:lumMod val="75000"/>
                   </a:schemeClr>
                 </a:solidFill>
               </a:rPr>
-              <a:t>:</a:t>
+              <a:t>{</a:t>
+            </a:r>
+            <a:r>
+              <a:rPr lang="de-DE" dirty="0"/>
+              <a:t> </a:t>
             </a:r>
             <a:r>
               <a:rPr lang="de-DE" sz="2800" b="1" i="1" dirty="0" err="1">
@@ -25493,29 +25462,25 @@
                   <a:schemeClr val="tx2"/>
                 </a:solidFill>
               </a:rPr>
-              <a:t>value</a:t>
-            </a:r>
-            <a:r>
-              <a:rPr lang="de-DE" sz="2800" b="1" dirty="0">
+              <a:t>key</a:t>
+            </a:r>
+            <a:r>
+              <a:rPr lang="de-DE" sz="2800" b="1" dirty="0" err="1">
                 <a:solidFill>
                   <a:schemeClr val="accent1">
                     <a:lumMod val="75000"/>
                   </a:schemeClr>
                 </a:solidFill>
               </a:rPr>
-              <a:t>, </a:t>
-            </a:r>
-            <a:r>
-              <a:rPr lang="de-DE" dirty="0"/>
-              <a:t>…</a:t>
-            </a:r>
-            <a:r>
-              <a:rPr lang="de-DE" sz="2800" b="1" i="1" dirty="0">
+              <a:t>:</a:t>
+            </a:r>
+            <a:r>
+              <a:rPr lang="de-DE" sz="2800" b="1" i="1" dirty="0" err="1">
                 <a:solidFill>
                   <a:schemeClr val="tx2"/>
                 </a:solidFill>
               </a:rPr>
-              <a:t> </a:t>
+              <a:t>value</a:t>
             </a:r>
             <a:r>
               <a:rPr lang="de-DE" sz="2800" b="1" dirty="0">
@@ -25525,23 +25490,35 @@
                   </a:schemeClr>
                 </a:solidFill>
               </a:rPr>
-              <a:t>};</a:t>
-            </a:r>
-          </a:p>
-          <a:p>
-            <a:r>
-              <a:rPr lang="de-DE" dirty="0"/>
-              <a:t>Zugriff über den Key in Klammern:</a:t>
-            </a:r>
-            <a:r>
-              <a:rPr lang="de-DE" b="1" dirty="0">
+              <a:t>, </a:t>
+            </a:r>
+            <a:r>
+              <a:rPr lang="de-DE" dirty="0"/>
+              <a:t>…</a:t>
+            </a:r>
+            <a:r>
+              <a:rPr lang="de-DE" sz="2800" b="1" i="1" dirty="0">
+                <a:solidFill>
+                  <a:schemeClr val="tx2"/>
+                </a:solidFill>
+              </a:rPr>
+              <a:t> </a:t>
+            </a:r>
+            <a:r>
+              <a:rPr lang="de-DE" sz="2800" b="1" dirty="0">
                 <a:solidFill>
                   <a:schemeClr val="accent1">
                     <a:lumMod val="75000"/>
                   </a:schemeClr>
                 </a:solidFill>
               </a:rPr>
-              <a:t/>
+              <a:t>};</a:t>
+            </a:r>
+          </a:p>
+          <a:p>
+            <a:r>
+              <a:rPr lang="de-DE" dirty="0"/>
+              <a:t>Zugriff über den Key in Klammern:</a:t>
             </a:r>
             <a:br>
               <a:rPr lang="de-DE" b="1" dirty="0">
@@ -25911,7 +25888,7 @@
                   <a:schemeClr val="tx2"/>
                 </a:solidFill>
               </a:rPr>
-              <a:t>dictionary</a:t>
+              <a:t>map</a:t>
             </a:r>
             <a:r>
               <a:rPr lang="de-DE" b="1" dirty="0" err="1">
@@ -25945,16 +25922,6 @@
             <a:r>
               <a:rPr lang="de-DE" dirty="0"/>
               <a:t>…</a:t>
-            </a:r>
-            <a:r>
-              <a:rPr lang="de-DE" b="1" dirty="0">
-                <a:solidFill>
-                  <a:schemeClr val="accent1">
-                    <a:lumMod val="75000"/>
-                  </a:schemeClr>
-                </a:solidFill>
-              </a:rPr>
-              <a:t/>
             </a:r>
             <a:br>
               <a:rPr lang="de-DE" b="1" dirty="0">
@@ -30074,13 +30041,6 @@
   <p:clrMapOvr>
     <a:masterClrMapping/>
   </p:clrMapOvr>
-  <p:timing>
-    <p:tnLst>
-      <p:par>
-        <p:cTn id="1" dur="indefinite" restart="never" nodeType="tmRoot"/>
-      </p:par>
-    </p:tnLst>
-  </p:timing>
 </p:sld>
 </file>
 
@@ -30391,16 +30351,6 @@
               <a:rPr lang="de-DE" dirty="0" err="1"/>
               <a:t>required</a:t>
             </a:r>
-            <a:r>
-              <a:rPr lang="de-DE" sz="2400" b="1" dirty="0">
-                <a:solidFill>
-                  <a:schemeClr val="accent1">
-                    <a:lumMod val="75000"/>
-                  </a:schemeClr>
-                </a:solidFill>
-              </a:rPr>
-              <a:t/>
-            </a:r>
             <a:br>
               <a:rPr lang="de-DE" sz="2400" b="1" dirty="0">
                 <a:solidFill>
@@ -30458,16 +30408,6 @@
             <a:r>
               <a:rPr lang="de-DE" dirty="0"/>
               <a:t>Oder mit Standardwert</a:t>
-            </a:r>
-            <a:r>
-              <a:rPr lang="de-DE" b="1" dirty="0">
-                <a:solidFill>
-                  <a:schemeClr val="accent1">
-                    <a:lumMod val="75000"/>
-                  </a:schemeClr>
-                </a:solidFill>
-              </a:rPr>
-              <a:t/>
             </a:r>
             <a:br>
               <a:rPr lang="de-DE" b="1" dirty="0">
@@ -30610,13 +30550,6 @@
   <p:clrMapOvr>
     <a:masterClrMapping/>
   </p:clrMapOvr>
-  <p:timing>
-    <p:tnLst>
-      <p:par>
-        <p:cTn id="1" dur="indefinite" restart="never" nodeType="tmRoot"/>
-      </p:par>
-    </p:tnLst>
-  </p:timing>
 </p:sld>
 </file>
 
@@ -31324,13 +31257,6 @@
   <p:clrMapOvr>
     <a:masterClrMapping/>
   </p:clrMapOvr>
-  <p:timing>
-    <p:tnLst>
-      <p:par>
-        <p:cTn id="1" dur="indefinite" restart="never" nodeType="tmRoot"/>
-      </p:par>
-    </p:tnLst>
-  </p:timing>
 </p:sld>
 </file>
 
@@ -31572,13 +31498,6 @@
   <p:clrMapOvr>
     <a:masterClrMapping/>
   </p:clrMapOvr>
-  <p:timing>
-    <p:tnLst>
-      <p:par>
-        <p:cTn id="1" dur="indefinite" restart="never" nodeType="tmRoot"/>
-      </p:par>
-    </p:tnLst>
-  </p:timing>
 </p:sld>
 </file>
 
@@ -34587,13 +34506,6 @@
   <p:clrMapOvr>
     <a:masterClrMapping/>
   </p:clrMapOvr>
-  <p:timing>
-    <p:tnLst>
-      <p:par>
-        <p:cTn id="1" dur="indefinite" restart="never" nodeType="tmRoot"/>
-      </p:par>
-    </p:tnLst>
-  </p:timing>
 </p:sld>
 </file>
 
@@ -34880,13 +34792,6 @@
   <p:clrMapOvr>
     <a:masterClrMapping/>
   </p:clrMapOvr>
-  <p:timing>
-    <p:tnLst>
-      <p:par>
-        <p:cTn id="1" dur="indefinite" restart="never" nodeType="tmRoot"/>
-      </p:par>
-    </p:tnLst>
-  </p:timing>
 </p:sld>
 </file>
 
@@ -35175,13 +35080,6 @@
   <p:clrMapOvr>
     <a:masterClrMapping/>
   </p:clrMapOvr>
-  <p:timing>
-    <p:tnLst>
-      <p:par>
-        <p:cTn id="1" dur="indefinite" restart="never" nodeType="tmRoot"/>
-      </p:par>
-    </p:tnLst>
-  </p:timing>
 </p:sld>
 </file>
 
@@ -35677,13 +35575,6 @@
   <p:clrMapOvr>
     <a:masterClrMapping/>
   </p:clrMapOvr>
-  <p:timing>
-    <p:tnLst>
-      <p:par>
-        <p:cTn id="1" dur="indefinite" restart="never" nodeType="tmRoot"/>
-      </p:par>
-    </p:tnLst>
-  </p:timing>
 </p:sld>
 </file>
 
@@ -36648,13 +36539,6 @@
   <p:clrMapOvr>
     <a:masterClrMapping/>
   </p:clrMapOvr>
-  <p:timing>
-    <p:tnLst>
-      <p:par>
-        <p:cTn id="1" dur="indefinite" restart="never" nodeType="tmRoot"/>
-      </p:par>
-    </p:tnLst>
-  </p:timing>
 </p:sld>
 </file>
 
@@ -36862,13 +36746,6 @@
   <p:clrMapOvr>
     <a:masterClrMapping/>
   </p:clrMapOvr>
-  <p:timing>
-    <p:tnLst>
-      <p:par>
-        <p:cTn id="1" dur="indefinite" restart="never" nodeType="tmRoot"/>
-      </p:par>
-    </p:tnLst>
-  </p:timing>
 </p:sld>
 </file>
 
@@ -37369,13 +37246,6 @@
   <p:clrMapOvr>
     <a:masterClrMapping/>
   </p:clrMapOvr>
-  <p:timing>
-    <p:tnLst>
-      <p:par>
-        <p:cTn id="1" dur="indefinite" restart="never" nodeType="tmRoot"/>
-      </p:par>
-    </p:tnLst>
-  </p:timing>
 </p:sld>
 </file>
 
@@ -38270,13 +38140,6 @@
   <p:clrMapOvr>
     <a:masterClrMapping/>
   </p:clrMapOvr>
-  <p:timing>
-    <p:tnLst>
-      <p:par>
-        <p:cTn id="1" dur="indefinite" restart="never" nodeType="tmRoot"/>
-      </p:par>
-    </p:tnLst>
-  </p:timing>
 </p:sld>
 </file>
 
@@ -38712,13 +38575,6 @@
   <p:clrMapOvr>
     <a:masterClrMapping/>
   </p:clrMapOvr>
-  <p:timing>
-    <p:tnLst>
-      <p:par>
-        <p:cTn id="1" dur="indefinite" restart="never" nodeType="tmRoot"/>
-      </p:par>
-    </p:tnLst>
-  </p:timing>
 </p:sld>
 </file>
 
@@ -39718,13 +39574,6 @@
   <p:clrMapOvr>
     <a:masterClrMapping/>
   </p:clrMapOvr>
-  <p:timing>
-    <p:tnLst>
-      <p:par>
-        <p:cTn id="1" dur="indefinite" restart="never" nodeType="tmRoot"/>
-      </p:par>
-    </p:tnLst>
-  </p:timing>
 </p:sld>
 </file>
 
@@ -40007,13 +39856,6 @@
   <p:clrMapOvr>
     <a:masterClrMapping/>
   </p:clrMapOvr>
-  <p:timing>
-    <p:tnLst>
-      <p:par>
-        <p:cTn id="1" dur="indefinite" restart="never" nodeType="tmRoot"/>
-      </p:par>
-    </p:tnLst>
-  </p:timing>
 </p:sld>
 </file>
 
@@ -40328,13 +40170,6 @@
   <p:clrMapOvr>
     <a:masterClrMapping/>
   </p:clrMapOvr>
-  <p:timing>
-    <p:tnLst>
-      <p:par>
-        <p:cTn id="1" dur="indefinite" restart="never" nodeType="tmRoot"/>
-      </p:par>
-    </p:tnLst>
-  </p:timing>
 </p:sld>
 </file>
 
@@ -40594,7 +40429,7 @@
           <a:blip r:embed="rId3">
             <a:extLst>
               <a:ext uri="{96DAC541-7B7A-43D3-8B79-37D633B846F1}">
-                <asvg:svgBlip xmlns:asvg="http://schemas.microsoft.com/office/drawing/2016/SVG/main" xmlns="" r:embed="rId4"/>
+                <asvg:svgBlip xmlns:asvg="http://schemas.microsoft.com/office/drawing/2016/SVG/main" r:embed="rId4"/>
               </a:ext>
             </a:extLst>
           </a:blip>
@@ -40630,7 +40465,7 @@
           <a:blip r:embed="rId5">
             <a:extLst>
               <a:ext uri="{96DAC541-7B7A-43D3-8B79-37D633B846F1}">
-                <asvg:svgBlip xmlns:asvg="http://schemas.microsoft.com/office/drawing/2016/SVG/main" xmlns="" r:embed="rId6"/>
+                <asvg:svgBlip xmlns:asvg="http://schemas.microsoft.com/office/drawing/2016/SVG/main" r:embed="rId6"/>
               </a:ext>
             </a:extLst>
           </a:blip>
@@ -40737,13 +40572,6 @@
   <p:clrMapOvr>
     <a:masterClrMapping/>
   </p:clrMapOvr>
-  <p:timing>
-    <p:tnLst>
-      <p:par>
-        <p:cTn id="1" dur="indefinite" restart="never" nodeType="tmRoot"/>
-      </p:par>
-    </p:tnLst>
-  </p:timing>
 </p:sld>
 </file>
 
@@ -41940,7 +41768,7 @@
                 <a14:useLocalDpi xmlns:a14="http://schemas.microsoft.com/office/drawing/2010/main" val="0"/>
               </a:ext>
               <a:ext uri="{96DAC541-7B7A-43D3-8B79-37D633B846F1}">
-                <asvg:svgBlip xmlns:asvg="http://schemas.microsoft.com/office/drawing/2016/SVG/main" xmlns="" r:embed="rId7"/>
+                <asvg:svgBlip xmlns:asvg="http://schemas.microsoft.com/office/drawing/2016/SVG/main" r:embed="rId7"/>
               </a:ext>
             </a:extLst>
           </a:blip>
@@ -46278,10 +46106,6 @@
             <a:br>
               <a:rPr lang="de-DE" dirty="0"/>
             </a:br>
-            <a:r>
-              <a:rPr lang="de-DE" dirty="0"/>
-              <a:t/>
-            </a:r>
             <a:br>
               <a:rPr lang="de-DE" dirty="0"/>
             </a:br>
@@ -47252,16 +47076,6 @@
             <a:r>
               <a:rPr lang="de-DE" dirty="0"/>
               <a:t>oder</a:t>
-            </a:r>
-            <a:r>
-              <a:rPr lang="de-DE" sz="2400" b="1" dirty="0">
-                <a:solidFill>
-                  <a:schemeClr val="accent1">
-                    <a:lumMod val="75000"/>
-                  </a:schemeClr>
-                </a:solidFill>
-              </a:rPr>
-              <a:t/>
             </a:r>
             <a:br>
               <a:rPr lang="de-DE" sz="2400" b="1" dirty="0">
@@ -47703,10 +47517,6 @@
               </a:rPr>
               <a:t>() {</a:t>
             </a:r>
-            <a:r>
-              <a:rPr lang="de-DE" i="1" dirty="0"/>
-              <a:t/>
-            </a:r>
             <a:br>
               <a:rPr lang="de-DE" i="1" dirty="0"/>
             </a:br>
@@ -47724,10 +47534,6 @@
               </a:rPr>
               <a:t>// hier irgendwas tun</a:t>
             </a:r>
-            <a:r>
-              <a:rPr lang="de-DE" i="1" dirty="0"/>
-              <a:t/>
-            </a:r>
             <a:br>
               <a:rPr lang="de-DE" i="1" dirty="0"/>
             </a:br>
@@ -47740,10 +47546,6 @@
                 </a:solidFill>
               </a:rPr>
               <a:t>    }</a:t>
-            </a:r>
-            <a:r>
-              <a:rPr lang="de-DE" i="1" dirty="0"/>
-              <a:t/>
             </a:r>
             <a:br>
               <a:rPr lang="de-DE" i="1" dirty="0"/>
@@ -48107,10 +47909,6 @@
               </a:rPr>
               <a:t>// Eigenschaft, die gleich einen Wert hat</a:t>
             </a:r>
-            <a:r>
-              <a:rPr lang="de-DE" i="1" dirty="0"/>
-              <a:t/>
-            </a:r>
             <a:br>
               <a:rPr lang="de-DE" i="1" dirty="0"/>
             </a:br>
@@ -48185,10 +47983,6 @@
                 </a:solidFill>
               </a:rPr>
             </a:br>
-            <a:r>
-              <a:rPr lang="de-DE" i="1" dirty="0"/>
-              <a:t/>
-            </a:r>
             <a:br>
               <a:rPr lang="de-DE" i="1" dirty="0"/>
             </a:br>
@@ -48250,10 +48044,6 @@
               </a:rPr>
               <a:t>) {</a:t>
             </a:r>
-            <a:r>
-              <a:rPr lang="de-DE" i="1" dirty="0"/>
-              <a:t/>
-            </a:r>
             <a:br>
               <a:rPr lang="de-DE" i="1" dirty="0"/>
             </a:br>
@@ -48307,10 +48097,6 @@
               </a:rPr>
               <a:t>// Jetzt hat sie einen Wert</a:t>
             </a:r>
-            <a:r>
-              <a:rPr lang="de-DE" i="1" dirty="0"/>
-              <a:t/>
-            </a:r>
             <a:br>
               <a:rPr lang="de-DE" i="1" dirty="0"/>
             </a:br>
@@ -48323,10 +48109,6 @@
                 </a:solidFill>
               </a:rPr>
               <a:t>    }</a:t>
-            </a:r>
-            <a:r>
-              <a:rPr lang="de-DE" i="1" dirty="0"/>
-              <a:t/>
             </a:r>
             <a:br>
               <a:rPr lang="de-DE" i="1" dirty="0"/>
@@ -49803,7 +49585,7 @@
               <a:t> </a:t>
             </a:r>
             <a:r>
-              <a:rPr lang="de-DE" b="1" smtClean="0">
+              <a:rPr lang="de-DE" b="1">
                 <a:solidFill>
                   <a:schemeClr val="accent1">
                     <a:lumMod val="75000"/>
@@ -50225,13 +50007,6 @@
   <p:clrMapOvr>
     <a:masterClrMapping/>
   </p:clrMapOvr>
-  <p:timing>
-    <p:tnLst>
-      <p:par>
-        <p:cTn id="1" dur="indefinite" restart="never" nodeType="tmRoot"/>
-      </p:par>
-    </p:tnLst>
-  </p:timing>
 </p:sld>
 </file>
 
@@ -50865,13 +50640,6 @@
   <p:clrMapOvr>
     <a:masterClrMapping/>
   </p:clrMapOvr>
-  <p:timing>
-    <p:tnLst>
-      <p:par>
-        <p:cTn id="1" dur="indefinite" restart="never" nodeType="tmRoot"/>
-      </p:par>
-    </p:tnLst>
-  </p:timing>
 </p:sld>
 </file>
 

</xml_diff>